<commit_message>
added JCDL SIGCM slides
</commit_message>
<xml_diff>
--- a/automorphisms/WODB-story.pptx
+++ b/automorphisms/WODB-story.pptx
@@ -5,7 +5,7 @@
     <p:sldMasterId id="2147483648" r:id="rId1"/>
   </p:sldMasterIdLst>
   <p:notesMasterIdLst>
-    <p:notesMasterId r:id="rId18"/>
+    <p:notesMasterId r:id="rId19"/>
   </p:notesMasterIdLst>
   <p:sldIdLst>
     <p:sldId id="271" r:id="rId2"/>
@@ -15,15 +15,16 @@
     <p:sldId id="264" r:id="rId6"/>
     <p:sldId id="265" r:id="rId7"/>
     <p:sldId id="278" r:id="rId8"/>
-    <p:sldId id="266" r:id="rId9"/>
-    <p:sldId id="276" r:id="rId10"/>
-    <p:sldId id="277" r:id="rId11"/>
-    <p:sldId id="269" r:id="rId12"/>
-    <p:sldId id="268" r:id="rId13"/>
-    <p:sldId id="257" r:id="rId14"/>
-    <p:sldId id="267" r:id="rId15"/>
-    <p:sldId id="258" r:id="rId16"/>
-    <p:sldId id="272" r:id="rId17"/>
+    <p:sldId id="279" r:id="rId9"/>
+    <p:sldId id="266" r:id="rId10"/>
+    <p:sldId id="276" r:id="rId11"/>
+    <p:sldId id="277" r:id="rId12"/>
+    <p:sldId id="269" r:id="rId13"/>
+    <p:sldId id="268" r:id="rId14"/>
+    <p:sldId id="257" r:id="rId15"/>
+    <p:sldId id="267" r:id="rId16"/>
+    <p:sldId id="258" r:id="rId17"/>
+    <p:sldId id="272" r:id="rId18"/>
   </p:sldIdLst>
   <p:sldSz cx="12192000" cy="6858000"/>
   <p:notesSz cx="6858000" cy="9144000"/>
@@ -212,7 +213,7 @@
           <a:p>
             <a:fld id="{F352BFEB-529B-5B4E-B2A3-75A70A3B81DC}" type="datetimeFigureOut">
               <a:rPr lang="en-US" smtClean="0"/>
-              <a:t>7/22/20</a:t>
+              <a:t>7/31/20</a:t>
             </a:fld>
             <a:endParaRPr lang="en-US"/>
           </a:p>
@@ -1307,12 +1308,107 @@
           <a:p>
             <a:r>
               <a:rPr lang="en-US" dirty="0"/>
-              <a:t>Variant: for red-green color blind people: change all colors to grey and see what </a:t>
-            </a:r>
-            <a:r>
-              <a:rPr lang="en-US"/>
-              <a:t>you get!</a:t>
-            </a:r>
+              <a:t>Sahil’s automorphism code finds that fig1 </a:t>
+            </a:r>
+            <a:r>
+              <a:rPr lang="en-US" dirty="0">
+                <a:sym typeface="Wingdings" pitchFamily="2" charset="2"/>
+              </a:rPr>
+              <a:t> fig3 and fig2  fig4 under the permutation: blue/red, large/box, circle/small ..</a:t>
+            </a:r>
+          </a:p>
+          <a:p>
+            <a:r>
+              <a:rPr lang="en-US" dirty="0">
+                <a:sym typeface="Wingdings" pitchFamily="2" charset="2"/>
+              </a:rPr>
+              <a:t>ID Size Color Shape</a:t>
+            </a:r>
+          </a:p>
+          <a:p>
+            <a:r>
+              <a:rPr lang="en-US" dirty="0">
+                <a:sym typeface="Wingdings" pitchFamily="2" charset="2"/>
+              </a:rPr>
+              <a:t>fig1 is a small red box</a:t>
+            </a:r>
+          </a:p>
+          <a:p>
+            <a:r>
+              <a:rPr lang="en-US" dirty="0">
+                <a:sym typeface="Wingdings" pitchFamily="2" charset="2"/>
+              </a:rPr>
+              <a:t>fig2 is a large blue box</a:t>
+            </a:r>
+          </a:p>
+          <a:p>
+            <a:r>
+              <a:rPr lang="en-US" dirty="0">
+                <a:sym typeface="Wingdings" pitchFamily="2" charset="2"/>
+              </a:rPr>
+              <a:t>fig3 is a large blue circle</a:t>
+            </a:r>
+          </a:p>
+          <a:p>
+            <a:r>
+              <a:rPr lang="en-US" dirty="0">
+                <a:sym typeface="Wingdings" pitchFamily="2" charset="2"/>
+              </a:rPr>
+              <a:t>fig4 is a large red box</a:t>
+            </a:r>
+          </a:p>
+          <a:p>
+            <a:endParaRPr lang="en-US" dirty="0">
+              <a:sym typeface="Wingdings" pitchFamily="2" charset="2"/>
+            </a:endParaRPr>
+          </a:p>
+          <a:p>
+            <a:r>
+              <a:rPr lang="en-US" dirty="0">
+                <a:sym typeface="Wingdings" pitchFamily="2" charset="2"/>
+              </a:rPr>
+              <a:t>ID Shape Color Size</a:t>
+            </a:r>
+          </a:p>
+          <a:p>
+            <a:r>
+              <a:rPr lang="en-US" dirty="0">
+                <a:sym typeface="Wingdings" pitchFamily="2" charset="2"/>
+              </a:rPr>
+              <a:t>fig3 is a circle blue large</a:t>
+            </a:r>
+          </a:p>
+          <a:p>
+            <a:r>
+              <a:rPr lang="en-US" dirty="0">
+                <a:sym typeface="Wingdings" pitchFamily="2" charset="2"/>
+              </a:rPr>
+              <a:t>fig4 is a box red large</a:t>
+            </a:r>
+          </a:p>
+          <a:p>
+            <a:r>
+              <a:rPr lang="en-US" dirty="0">
+                <a:sym typeface="Wingdings" pitchFamily="2" charset="2"/>
+              </a:rPr>
+              <a:t>fig1 is a box red small</a:t>
+            </a:r>
+          </a:p>
+          <a:p>
+            <a:r>
+              <a:rPr lang="en-US" dirty="0">
+                <a:sym typeface="Wingdings" pitchFamily="2" charset="2"/>
+              </a:rPr>
+              <a:t>fig2 is a box blue large</a:t>
+            </a:r>
+          </a:p>
+          <a:p>
+            <a:endParaRPr lang="en-US" dirty="0">
+              <a:sym typeface="Wingdings" pitchFamily="2" charset="2"/>
+            </a:endParaRPr>
+          </a:p>
+          <a:p>
+            <a:endParaRPr lang="en-US" dirty="0"/>
           </a:p>
         </p:txBody>
       </p:sp>
@@ -1342,7 +1438,7 @@
     </p:spTree>
     <p:extLst>
       <p:ext uri="{BB962C8B-B14F-4D97-AF65-F5344CB8AC3E}">
-        <p14:creationId xmlns:p14="http://schemas.microsoft.com/office/powerpoint/2010/main" val="534793492"/>
+        <p14:creationId xmlns:p14="http://schemas.microsoft.com/office/powerpoint/2010/main" val="4290860011"/>
       </p:ext>
     </p:extLst>
   </p:cSld>
@@ -1433,7 +1529,7 @@
     </p:spTree>
     <p:extLst>
       <p:ext uri="{BB962C8B-B14F-4D97-AF65-F5344CB8AC3E}">
-        <p14:creationId xmlns:p14="http://schemas.microsoft.com/office/powerpoint/2010/main" val="711768676"/>
+        <p14:creationId xmlns:p14="http://schemas.microsoft.com/office/powerpoint/2010/main" val="534793492"/>
       </p:ext>
     </p:extLst>
   </p:cSld>
@@ -1515,7 +1611,98 @@
           <a:p>
             <a:fld id="{E7EC19A3-AC65-4B48-9D18-637C19446F37}" type="slidenum">
               <a:rPr lang="en-US" smtClean="0"/>
-              <a:t>11</a:t>
+              <a:t>10</a:t>
+            </a:fld>
+            <a:endParaRPr lang="en-US"/>
+          </a:p>
+        </p:txBody>
+      </p:sp>
+    </p:spTree>
+    <p:extLst>
+      <p:ext uri="{BB962C8B-B14F-4D97-AF65-F5344CB8AC3E}">
+        <p14:creationId xmlns:p14="http://schemas.microsoft.com/office/powerpoint/2010/main" val="711768676"/>
+      </p:ext>
+    </p:extLst>
+  </p:cSld>
+  <p:clrMapOvr>
+    <a:masterClrMapping/>
+  </p:clrMapOvr>
+</p:notes>
+</file>
+
+<file path=ppt/notesSlides/notesSlide9.xml><?xml version="1.0" encoding="utf-8"?>
+<p:notes xmlns:a="http://schemas.openxmlformats.org/drawingml/2006/main" xmlns:r="http://schemas.openxmlformats.org/officeDocument/2006/relationships" xmlns:p="http://schemas.openxmlformats.org/presentationml/2006/main">
+  <p:cSld>
+    <p:spTree>
+      <p:nvGrpSpPr>
+        <p:cNvPr id="1" name=""/>
+        <p:cNvGrpSpPr/>
+        <p:nvPr/>
+      </p:nvGrpSpPr>
+      <p:grpSpPr>
+        <a:xfrm>
+          <a:off x="0" y="0"/>
+          <a:ext cx="0" cy="0"/>
+          <a:chOff x="0" y="0"/>
+          <a:chExt cx="0" cy="0"/>
+        </a:xfrm>
+      </p:grpSpPr>
+      <p:sp>
+        <p:nvSpPr>
+          <p:cNvPr id="2" name="Slide Image Placeholder 1"/>
+          <p:cNvSpPr>
+            <a:spLocks noGrp="1" noRot="1" noChangeAspect="1"/>
+          </p:cNvSpPr>
+          <p:nvPr>
+            <p:ph type="sldImg"/>
+          </p:nvPr>
+        </p:nvSpPr>
+        <p:spPr/>
+      </p:sp>
+      <p:sp>
+        <p:nvSpPr>
+          <p:cNvPr id="3" name="Notes Placeholder 2"/>
+          <p:cNvSpPr>
+            <a:spLocks noGrp="1"/>
+          </p:cNvSpPr>
+          <p:nvPr>
+            <p:ph type="body" idx="1"/>
+          </p:nvPr>
+        </p:nvSpPr>
+        <p:spPr/>
+        <p:txBody>
+          <a:bodyPr/>
+          <a:lstStyle/>
+          <a:p>
+            <a:r>
+              <a:rPr lang="en-US" dirty="0"/>
+              <a:t>Variant: for red-green color blind people: change all colors to grey and see what </a:t>
+            </a:r>
+            <a:r>
+              <a:rPr lang="en-US"/>
+              <a:t>you get!</a:t>
+            </a:r>
+          </a:p>
+        </p:txBody>
+      </p:sp>
+      <p:sp>
+        <p:nvSpPr>
+          <p:cNvPr id="4" name="Slide Number Placeholder 3"/>
+          <p:cNvSpPr>
+            <a:spLocks noGrp="1"/>
+          </p:cNvSpPr>
+          <p:nvPr>
+            <p:ph type="sldNum" sz="quarter" idx="5"/>
+          </p:nvPr>
+        </p:nvSpPr>
+        <p:spPr/>
+        <p:txBody>
+          <a:bodyPr/>
+          <a:lstStyle/>
+          <a:p>
+            <a:fld id="{E7EC19A3-AC65-4B48-9D18-637C19446F37}" type="slidenum">
+              <a:rPr lang="en-US" smtClean="0"/>
+              <a:t>12</a:t>
             </a:fld>
             <a:endParaRPr lang="en-US"/>
           </a:p>
@@ -1681,7 +1868,7 @@
           <a:p>
             <a:fld id="{DB1C08F3-D52C-D347-99D7-6B04B9BCB4D4}" type="datetimeFigureOut">
               <a:rPr lang="en-US" smtClean="0"/>
-              <a:t>7/22/20</a:t>
+              <a:t>7/31/20</a:t>
             </a:fld>
             <a:endParaRPr lang="en-US"/>
           </a:p>
@@ -1879,7 +2066,7 @@
           <a:p>
             <a:fld id="{DB1C08F3-D52C-D347-99D7-6B04B9BCB4D4}" type="datetimeFigureOut">
               <a:rPr lang="en-US" smtClean="0"/>
-              <a:t>7/22/20</a:t>
+              <a:t>7/31/20</a:t>
             </a:fld>
             <a:endParaRPr lang="en-US"/>
           </a:p>
@@ -2087,7 +2274,7 @@
           <a:p>
             <a:fld id="{DB1C08F3-D52C-D347-99D7-6B04B9BCB4D4}" type="datetimeFigureOut">
               <a:rPr lang="en-US" smtClean="0"/>
-              <a:t>7/22/20</a:t>
+              <a:t>7/31/20</a:t>
             </a:fld>
             <a:endParaRPr lang="en-US"/>
           </a:p>
@@ -2285,7 +2472,7 @@
           <a:p>
             <a:fld id="{DB1C08F3-D52C-D347-99D7-6B04B9BCB4D4}" type="datetimeFigureOut">
               <a:rPr lang="en-US" smtClean="0"/>
-              <a:t>7/22/20</a:t>
+              <a:t>7/31/20</a:t>
             </a:fld>
             <a:endParaRPr lang="en-US"/>
           </a:p>
@@ -2560,7 +2747,7 @@
           <a:p>
             <a:fld id="{DB1C08F3-D52C-D347-99D7-6B04B9BCB4D4}" type="datetimeFigureOut">
               <a:rPr lang="en-US" smtClean="0"/>
-              <a:t>7/22/20</a:t>
+              <a:t>7/31/20</a:t>
             </a:fld>
             <a:endParaRPr lang="en-US"/>
           </a:p>
@@ -2825,7 +3012,7 @@
           <a:p>
             <a:fld id="{DB1C08F3-D52C-D347-99D7-6B04B9BCB4D4}" type="datetimeFigureOut">
               <a:rPr lang="en-US" smtClean="0"/>
-              <a:t>7/22/20</a:t>
+              <a:t>7/31/20</a:t>
             </a:fld>
             <a:endParaRPr lang="en-US"/>
           </a:p>
@@ -3237,7 +3424,7 @@
           <a:p>
             <a:fld id="{DB1C08F3-D52C-D347-99D7-6B04B9BCB4D4}" type="datetimeFigureOut">
               <a:rPr lang="en-US" smtClean="0"/>
-              <a:t>7/22/20</a:t>
+              <a:t>7/31/20</a:t>
             </a:fld>
             <a:endParaRPr lang="en-US"/>
           </a:p>
@@ -3378,7 +3565,7 @@
           <a:p>
             <a:fld id="{DB1C08F3-D52C-D347-99D7-6B04B9BCB4D4}" type="datetimeFigureOut">
               <a:rPr lang="en-US" smtClean="0"/>
-              <a:t>7/22/20</a:t>
+              <a:t>7/31/20</a:t>
             </a:fld>
             <a:endParaRPr lang="en-US"/>
           </a:p>
@@ -3491,7 +3678,7 @@
           <a:p>
             <a:fld id="{DB1C08F3-D52C-D347-99D7-6B04B9BCB4D4}" type="datetimeFigureOut">
               <a:rPr lang="en-US" smtClean="0"/>
-              <a:t>7/22/20</a:t>
+              <a:t>7/31/20</a:t>
             </a:fld>
             <a:endParaRPr lang="en-US"/>
           </a:p>
@@ -3802,7 +3989,7 @@
           <a:p>
             <a:fld id="{DB1C08F3-D52C-D347-99D7-6B04B9BCB4D4}" type="datetimeFigureOut">
               <a:rPr lang="en-US" smtClean="0"/>
-              <a:t>7/22/20</a:t>
+              <a:t>7/31/20</a:t>
             </a:fld>
             <a:endParaRPr lang="en-US"/>
           </a:p>
@@ -4090,7 +4277,7 @@
           <a:p>
             <a:fld id="{DB1C08F3-D52C-D347-99D7-6B04B9BCB4D4}" type="datetimeFigureOut">
               <a:rPr lang="en-US" smtClean="0"/>
-              <a:t>7/22/20</a:t>
+              <a:t>7/31/20</a:t>
             </a:fld>
             <a:endParaRPr lang="en-US"/>
           </a:p>
@@ -4331,7 +4518,7 @@
           <a:p>
             <a:fld id="{DB1C08F3-D52C-D347-99D7-6B04B9BCB4D4}" type="datetimeFigureOut">
               <a:rPr lang="en-US" smtClean="0"/>
-              <a:t>7/22/20</a:t>
+              <a:t>7/31/20</a:t>
             </a:fld>
             <a:endParaRPr lang="en-US"/>
           </a:p>
@@ -4931,6 +5118,921 @@
           <a:chExt cx="0" cy="0"/>
         </a:xfrm>
       </p:grpSpPr>
+      <p:grpSp>
+        <p:nvGrpSpPr>
+          <p:cNvPr id="3" name="Group 2">
+            <a:extLst>
+              <a:ext uri="{FF2B5EF4-FFF2-40B4-BE49-F238E27FC236}">
+                <a16:creationId xmlns:a16="http://schemas.microsoft.com/office/drawing/2014/main" id="{329804F1-EC99-6640-9898-8D1180320E91}"/>
+              </a:ext>
+            </a:extLst>
+          </p:cNvPr>
+          <p:cNvGrpSpPr/>
+          <p:nvPr/>
+        </p:nvGrpSpPr>
+        <p:grpSpPr>
+          <a:xfrm>
+            <a:off x="6832452" y="1416317"/>
+            <a:ext cx="2020009" cy="1733107"/>
+            <a:chOff x="5119398" y="548219"/>
+            <a:chExt cx="2020009" cy="1733107"/>
+          </a:xfrm>
+        </p:grpSpPr>
+        <p:sp>
+          <p:nvSpPr>
+            <p:cNvPr id="10" name="Rectangle 9">
+              <a:extLst>
+                <a:ext uri="{FF2B5EF4-FFF2-40B4-BE49-F238E27FC236}">
+                  <a16:creationId xmlns:a16="http://schemas.microsoft.com/office/drawing/2014/main" id="{88B1E9FC-E61C-A74B-A20A-0A5E6A186F9E}"/>
+                </a:ext>
+              </a:extLst>
+            </p:cNvPr>
+            <p:cNvSpPr/>
+            <p:nvPr/>
+          </p:nvSpPr>
+          <p:spPr>
+            <a:xfrm>
+              <a:off x="5289753" y="715273"/>
+              <a:ext cx="366181" cy="366181"/>
+            </a:xfrm>
+            <a:prstGeom prst="rect">
+              <a:avLst/>
+            </a:prstGeom>
+            <a:solidFill>
+              <a:srgbClr val="FF0000"/>
+            </a:solidFill>
+          </p:spPr>
+          <p:style>
+            <a:lnRef idx="2">
+              <a:schemeClr val="accent1">
+                <a:shade val="50000"/>
+              </a:schemeClr>
+            </a:lnRef>
+            <a:fillRef idx="1">
+              <a:schemeClr val="accent1"/>
+            </a:fillRef>
+            <a:effectRef idx="0">
+              <a:schemeClr val="accent1"/>
+            </a:effectRef>
+            <a:fontRef idx="minor">
+              <a:schemeClr val="lt1"/>
+            </a:fontRef>
+          </p:style>
+          <p:txBody>
+            <a:bodyPr rtlCol="0" anchor="ctr"/>
+            <a:lstStyle/>
+            <a:p>
+              <a:pPr algn="ctr"/>
+              <a:endParaRPr lang="en-US"/>
+            </a:p>
+          </p:txBody>
+        </p:sp>
+        <p:sp>
+          <p:nvSpPr>
+            <p:cNvPr id="11" name="Oval 10">
+              <a:extLst>
+                <a:ext uri="{FF2B5EF4-FFF2-40B4-BE49-F238E27FC236}">
+                  <a16:creationId xmlns:a16="http://schemas.microsoft.com/office/drawing/2014/main" id="{A570C3FF-1D00-9841-9058-AA75D28DC163}"/>
+                </a:ext>
+              </a:extLst>
+            </p:cNvPr>
+            <p:cNvSpPr/>
+            <p:nvPr/>
+          </p:nvSpPr>
+          <p:spPr>
+            <a:xfrm>
+              <a:off x="5119398" y="1568944"/>
+              <a:ext cx="712382" cy="712382"/>
+            </a:xfrm>
+            <a:prstGeom prst="ellipse">
+              <a:avLst/>
+            </a:prstGeom>
+            <a:solidFill>
+              <a:srgbClr val="FF0000"/>
+            </a:solidFill>
+          </p:spPr>
+          <p:style>
+            <a:lnRef idx="2">
+              <a:schemeClr val="accent1">
+                <a:shade val="50000"/>
+              </a:schemeClr>
+            </a:lnRef>
+            <a:fillRef idx="1">
+              <a:schemeClr val="accent1"/>
+            </a:fillRef>
+            <a:effectRef idx="0">
+              <a:schemeClr val="accent1"/>
+            </a:effectRef>
+            <a:fontRef idx="minor">
+              <a:schemeClr val="lt1"/>
+            </a:fontRef>
+          </p:style>
+          <p:txBody>
+            <a:bodyPr rtlCol="0" anchor="ctr"/>
+            <a:lstStyle/>
+            <a:p>
+              <a:pPr algn="ctr"/>
+              <a:endParaRPr lang="en-US">
+                <a:solidFill>
+                  <a:srgbClr val="00B050"/>
+                </a:solidFill>
+              </a:endParaRPr>
+            </a:p>
+          </p:txBody>
+        </p:sp>
+        <p:sp>
+          <p:nvSpPr>
+            <p:cNvPr id="22" name="Rectangle 21">
+              <a:extLst>
+                <a:ext uri="{FF2B5EF4-FFF2-40B4-BE49-F238E27FC236}">
+                  <a16:creationId xmlns:a16="http://schemas.microsoft.com/office/drawing/2014/main" id="{A93A280D-6F59-7946-AD82-034A1841B283}"/>
+                </a:ext>
+              </a:extLst>
+            </p:cNvPr>
+            <p:cNvSpPr/>
+            <p:nvPr/>
+          </p:nvSpPr>
+          <p:spPr>
+            <a:xfrm>
+              <a:off x="6427026" y="1568945"/>
+              <a:ext cx="712381" cy="712381"/>
+            </a:xfrm>
+            <a:prstGeom prst="rect">
+              <a:avLst/>
+            </a:prstGeom>
+            <a:solidFill>
+              <a:srgbClr val="FF0000"/>
+            </a:solidFill>
+          </p:spPr>
+          <p:style>
+            <a:lnRef idx="2">
+              <a:schemeClr val="accent1">
+                <a:shade val="50000"/>
+              </a:schemeClr>
+            </a:lnRef>
+            <a:fillRef idx="1">
+              <a:schemeClr val="accent1"/>
+            </a:fillRef>
+            <a:effectRef idx="0">
+              <a:schemeClr val="accent1"/>
+            </a:effectRef>
+            <a:fontRef idx="minor">
+              <a:schemeClr val="lt1"/>
+            </a:fontRef>
+          </p:style>
+          <p:txBody>
+            <a:bodyPr rtlCol="0" anchor="ctr"/>
+            <a:lstStyle/>
+            <a:p>
+              <a:pPr algn="ctr"/>
+              <a:endParaRPr lang="en-US"/>
+            </a:p>
+          </p:txBody>
+        </p:sp>
+        <p:sp>
+          <p:nvSpPr>
+            <p:cNvPr id="23" name="Rectangle 22">
+              <a:extLst>
+                <a:ext uri="{FF2B5EF4-FFF2-40B4-BE49-F238E27FC236}">
+                  <a16:creationId xmlns:a16="http://schemas.microsoft.com/office/drawing/2014/main" id="{1E039D96-646B-F842-A490-44A4095A7F55}"/>
+                </a:ext>
+              </a:extLst>
+            </p:cNvPr>
+            <p:cNvSpPr/>
+            <p:nvPr/>
+          </p:nvSpPr>
+          <p:spPr>
+            <a:xfrm>
+              <a:off x="6427026" y="548219"/>
+              <a:ext cx="712381" cy="712381"/>
+            </a:xfrm>
+            <a:prstGeom prst="rect">
+              <a:avLst/>
+            </a:prstGeom>
+            <a:solidFill>
+              <a:schemeClr val="accent6"/>
+            </a:solidFill>
+          </p:spPr>
+          <p:style>
+            <a:lnRef idx="2">
+              <a:schemeClr val="accent1">
+                <a:shade val="50000"/>
+              </a:schemeClr>
+            </a:lnRef>
+            <a:fillRef idx="1">
+              <a:schemeClr val="accent1"/>
+            </a:fillRef>
+            <a:effectRef idx="0">
+              <a:schemeClr val="accent1"/>
+            </a:effectRef>
+            <a:fontRef idx="minor">
+              <a:schemeClr val="lt1"/>
+            </a:fontRef>
+          </p:style>
+          <p:txBody>
+            <a:bodyPr rtlCol="0" anchor="ctr"/>
+            <a:lstStyle/>
+            <a:p>
+              <a:pPr algn="ctr"/>
+              <a:endParaRPr lang="en-US"/>
+            </a:p>
+          </p:txBody>
+        </p:sp>
+      </p:grpSp>
+      <p:sp>
+        <p:nvSpPr>
+          <p:cNvPr id="2" name="TextBox 1">
+            <a:extLst>
+              <a:ext uri="{FF2B5EF4-FFF2-40B4-BE49-F238E27FC236}">
+                <a16:creationId xmlns:a16="http://schemas.microsoft.com/office/drawing/2014/main" id="{3B297FFD-21FA-EB4F-93E9-3342B135EDF9}"/>
+              </a:ext>
+            </a:extLst>
+          </p:cNvPr>
+          <p:cNvSpPr txBox="1"/>
+          <p:nvPr/>
+        </p:nvSpPr>
+        <p:spPr>
+          <a:xfrm>
+            <a:off x="756139" y="1849943"/>
+            <a:ext cx="2200924" cy="4247317"/>
+          </a:xfrm>
+          <a:prstGeom prst="rect">
+            <a:avLst/>
+          </a:prstGeom>
+          <a:noFill/>
+        </p:spPr>
+        <p:txBody>
+          <a:bodyPr wrap="none" rtlCol="0">
+            <a:spAutoFit/>
+          </a:bodyPr>
+          <a:lstStyle/>
+          <a:p>
+            <a:r>
+              <a:rPr lang="en-US" dirty="0"/>
+              <a:t>property(fig1, red).</a:t>
+            </a:r>
+          </a:p>
+          <a:p>
+            <a:r>
+              <a:rPr lang="en-US" dirty="0"/>
+              <a:t>property(fig1, box).</a:t>
+            </a:r>
+          </a:p>
+          <a:p>
+            <a:r>
+              <a:rPr lang="en-US" dirty="0"/>
+              <a:t>property(fig1, small).</a:t>
+            </a:r>
+          </a:p>
+          <a:p>
+            <a:endParaRPr lang="en-US" dirty="0"/>
+          </a:p>
+          <a:p>
+            <a:r>
+              <a:rPr lang="en-US" dirty="0"/>
+              <a:t>property(fig2, green).</a:t>
+            </a:r>
+          </a:p>
+          <a:p>
+            <a:r>
+              <a:rPr lang="en-US" dirty="0"/>
+              <a:t>property(fig2, box).</a:t>
+            </a:r>
+          </a:p>
+          <a:p>
+            <a:r>
+              <a:rPr lang="en-US" dirty="0"/>
+              <a:t>property(fig2, large).</a:t>
+            </a:r>
+          </a:p>
+          <a:p>
+            <a:endParaRPr lang="en-US" dirty="0"/>
+          </a:p>
+          <a:p>
+            <a:r>
+              <a:rPr lang="en-US" dirty="0"/>
+              <a:t>property(fig3, red).</a:t>
+            </a:r>
+          </a:p>
+          <a:p>
+            <a:r>
+              <a:rPr lang="en-US" dirty="0"/>
+              <a:t>property(fig3, circle).</a:t>
+            </a:r>
+          </a:p>
+          <a:p>
+            <a:r>
+              <a:rPr lang="en-US" dirty="0"/>
+              <a:t>property(fig3, large).</a:t>
+            </a:r>
+          </a:p>
+          <a:p>
+            <a:endParaRPr lang="en-US" dirty="0"/>
+          </a:p>
+          <a:p>
+            <a:r>
+              <a:rPr lang="en-US" dirty="0"/>
+              <a:t>property(fig4, red).</a:t>
+            </a:r>
+          </a:p>
+          <a:p>
+            <a:r>
+              <a:rPr lang="en-US" dirty="0"/>
+              <a:t>property(fig4, box).</a:t>
+            </a:r>
+          </a:p>
+          <a:p>
+            <a:r>
+              <a:rPr lang="en-US" dirty="0"/>
+              <a:t>property(fig4, large).</a:t>
+            </a:r>
+          </a:p>
+        </p:txBody>
+      </p:sp>
+      <p:sp>
+        <p:nvSpPr>
+          <p:cNvPr id="24" name="TextBox 23">
+            <a:extLst>
+              <a:ext uri="{FF2B5EF4-FFF2-40B4-BE49-F238E27FC236}">
+                <a16:creationId xmlns:a16="http://schemas.microsoft.com/office/drawing/2014/main" id="{90BB4E62-C7CE-444C-B9F7-1DD2BE18B97A}"/>
+              </a:ext>
+            </a:extLst>
+          </p:cNvPr>
+          <p:cNvSpPr txBox="1"/>
+          <p:nvPr/>
+        </p:nvSpPr>
+        <p:spPr>
+          <a:xfrm>
+            <a:off x="4189979" y="3179890"/>
+            <a:ext cx="5991835" cy="3600986"/>
+          </a:xfrm>
+          <a:prstGeom prst="rect">
+            <a:avLst/>
+          </a:prstGeom>
+          <a:noFill/>
+        </p:spPr>
+        <p:txBody>
+          <a:bodyPr wrap="square" rtlCol="0">
+            <a:spAutoFit/>
+          </a:bodyPr>
+          <a:lstStyle/>
+          <a:p>
+            <a:r>
+              <a:rPr lang="en-US" sz="1200" dirty="0">
+                <a:solidFill>
+                  <a:srgbClr val="C00000"/>
+                </a:solidFill>
+                <a:latin typeface="Consolas" panose="020B0609020204030204" pitchFamily="49" charset="0"/>
+                <a:cs typeface="Consolas" panose="020B0609020204030204" pitchFamily="49" charset="0"/>
+              </a:rPr>
+              <a:t>% Fig. X is unique </a:t>
+            </a:r>
+            <a:r>
+              <a:rPr lang="en-US" sz="1200" dirty="0" err="1">
+                <a:solidFill>
+                  <a:srgbClr val="C00000"/>
+                </a:solidFill>
+                <a:latin typeface="Consolas" panose="020B0609020204030204" pitchFamily="49" charset="0"/>
+                <a:cs typeface="Consolas" panose="020B0609020204030204" pitchFamily="49" charset="0"/>
+              </a:rPr>
+              <a:t>wrt</a:t>
+            </a:r>
+            <a:r>
+              <a:rPr lang="en-US" sz="1200" dirty="0">
+                <a:solidFill>
+                  <a:srgbClr val="C00000"/>
+                </a:solidFill>
+                <a:latin typeface="Consolas" panose="020B0609020204030204" pitchFamily="49" charset="0"/>
+                <a:cs typeface="Consolas" panose="020B0609020204030204" pitchFamily="49" charset="0"/>
+              </a:rPr>
+              <a:t> property P and value V, if there is no ..</a:t>
+            </a:r>
+          </a:p>
+          <a:p>
+            <a:r>
+              <a:rPr lang="en-US" sz="1200" b="1" dirty="0">
+                <a:solidFill>
+                  <a:srgbClr val="0432FF"/>
+                </a:solidFill>
+                <a:latin typeface="Consolas" panose="020B0609020204030204" pitchFamily="49" charset="0"/>
+                <a:cs typeface="Consolas" panose="020B0609020204030204" pitchFamily="49" charset="0"/>
+              </a:rPr>
+              <a:t>unique</a:t>
+            </a:r>
+            <a:r>
+              <a:rPr lang="en-US" sz="1200" dirty="0">
+                <a:latin typeface="Consolas" panose="020B0609020204030204" pitchFamily="49" charset="0"/>
+                <a:cs typeface="Consolas" panose="020B0609020204030204" pitchFamily="49" charset="0"/>
+              </a:rPr>
+              <a:t>(F,V) :- property(F,V), </a:t>
+            </a:r>
+            <a:r>
+              <a:rPr lang="en-US" sz="1200" b="1" dirty="0">
+                <a:latin typeface="Consolas" panose="020B0609020204030204" pitchFamily="49" charset="0"/>
+                <a:cs typeface="Consolas" panose="020B0609020204030204" pitchFamily="49" charset="0"/>
+              </a:rPr>
+              <a:t>not</a:t>
+            </a:r>
+            <a:r>
+              <a:rPr lang="en-US" sz="1200" dirty="0">
+                <a:latin typeface="Consolas" panose="020B0609020204030204" pitchFamily="49" charset="0"/>
+                <a:cs typeface="Consolas" panose="020B0609020204030204" pitchFamily="49" charset="0"/>
+              </a:rPr>
+              <a:t> </a:t>
+            </a:r>
+            <a:r>
+              <a:rPr lang="en-US" sz="1200" dirty="0" err="1">
+                <a:latin typeface="Consolas" panose="020B0609020204030204" pitchFamily="49" charset="0"/>
+                <a:cs typeface="Consolas" panose="020B0609020204030204" pitchFamily="49" charset="0"/>
+              </a:rPr>
+              <a:t>exists_diff</a:t>
+            </a:r>
+            <a:r>
+              <a:rPr lang="en-US" sz="1200" dirty="0">
+                <a:latin typeface="Consolas" panose="020B0609020204030204" pitchFamily="49" charset="0"/>
+                <a:cs typeface="Consolas" panose="020B0609020204030204" pitchFamily="49" charset="0"/>
+              </a:rPr>
+              <a:t>(F,V).</a:t>
+            </a:r>
+          </a:p>
+          <a:p>
+            <a:endParaRPr lang="en-US" sz="1200" dirty="0">
+              <a:latin typeface="Consolas" panose="020B0609020204030204" pitchFamily="49" charset="0"/>
+              <a:cs typeface="Consolas" panose="020B0609020204030204" pitchFamily="49" charset="0"/>
+            </a:endParaRPr>
+          </a:p>
+          <a:p>
+            <a:r>
+              <a:rPr lang="en-US" sz="1200" dirty="0">
+                <a:solidFill>
+                  <a:srgbClr val="C00000"/>
+                </a:solidFill>
+                <a:latin typeface="Consolas" panose="020B0609020204030204" pitchFamily="49" charset="0"/>
+                <a:cs typeface="Consolas" panose="020B0609020204030204" pitchFamily="49" charset="0"/>
+              </a:rPr>
+              <a:t>% .. other figure Y that has the same property/value pair: </a:t>
+            </a:r>
+          </a:p>
+          <a:p>
+            <a:r>
+              <a:rPr lang="en-US" sz="1200" b="1" dirty="0" err="1">
+                <a:solidFill>
+                  <a:srgbClr val="0432FF"/>
+                </a:solidFill>
+                <a:latin typeface="Consolas" panose="020B0609020204030204" pitchFamily="49" charset="0"/>
+                <a:cs typeface="Consolas" panose="020B0609020204030204" pitchFamily="49" charset="0"/>
+              </a:rPr>
+              <a:t>exists_diff</a:t>
+            </a:r>
+            <a:r>
+              <a:rPr lang="en-US" sz="1200" dirty="0">
+                <a:latin typeface="Consolas" panose="020B0609020204030204" pitchFamily="49" charset="0"/>
+                <a:cs typeface="Consolas" panose="020B0609020204030204" pitchFamily="49" charset="0"/>
+              </a:rPr>
+              <a:t>(F,V) :- property(F,V), property(F2,V), F != F2. </a:t>
+            </a:r>
+          </a:p>
+          <a:p>
+            <a:endParaRPr lang="en-US" sz="1200" dirty="0">
+              <a:latin typeface="Consolas" panose="020B0609020204030204" pitchFamily="49" charset="0"/>
+              <a:cs typeface="Consolas" panose="020B0609020204030204" pitchFamily="49" charset="0"/>
+            </a:endParaRPr>
+          </a:p>
+          <a:p>
+            <a:r>
+              <a:rPr lang="en-US" sz="1200" dirty="0">
+                <a:solidFill>
+                  <a:srgbClr val="FF0000"/>
+                </a:solidFill>
+                <a:latin typeface="Consolas" panose="020B0609020204030204" pitchFamily="49" charset="0"/>
+                <a:cs typeface="Consolas" panose="020B0609020204030204" pitchFamily="49" charset="0"/>
+              </a:rPr>
+              <a:t>% Which figure F is special (</a:t>
+            </a:r>
+            <a:r>
+              <a:rPr lang="en-US" sz="1200" dirty="0" err="1">
+                <a:solidFill>
+                  <a:srgbClr val="FF0000"/>
+                </a:solidFill>
+                <a:latin typeface="Consolas" panose="020B0609020204030204" pitchFamily="49" charset="0"/>
+                <a:cs typeface="Consolas" panose="020B0609020204030204" pitchFamily="49" charset="0"/>
+              </a:rPr>
+              <a:t>wrt</a:t>
+            </a:r>
+            <a:r>
+              <a:rPr lang="en-US" sz="1200" dirty="0">
+                <a:solidFill>
+                  <a:srgbClr val="FF0000"/>
+                </a:solidFill>
+                <a:latin typeface="Consolas" panose="020B0609020204030204" pitchFamily="49" charset="0"/>
+                <a:cs typeface="Consolas" panose="020B0609020204030204" pitchFamily="49" charset="0"/>
+              </a:rPr>
+              <a:t> some property / value)</a:t>
+            </a:r>
+          </a:p>
+          <a:p>
+            <a:r>
+              <a:rPr lang="en-US" sz="1200" b="1" dirty="0">
+                <a:solidFill>
+                  <a:srgbClr val="0432FF"/>
+                </a:solidFill>
+                <a:latin typeface="Consolas" panose="020B0609020204030204" pitchFamily="49" charset="0"/>
+                <a:cs typeface="Consolas" panose="020B0609020204030204" pitchFamily="49" charset="0"/>
+              </a:rPr>
+              <a:t>special</a:t>
+            </a:r>
+            <a:r>
+              <a:rPr lang="en-US" sz="1200" dirty="0">
+                <a:latin typeface="Consolas" panose="020B0609020204030204" pitchFamily="49" charset="0"/>
+                <a:cs typeface="Consolas" panose="020B0609020204030204" pitchFamily="49" charset="0"/>
+              </a:rPr>
+              <a:t>(F) :- unique(F,_).</a:t>
+            </a:r>
+          </a:p>
+          <a:p>
+            <a:r>
+              <a:rPr lang="en-US" sz="1200" b="1" dirty="0">
+                <a:solidFill>
+                  <a:srgbClr val="0432FF"/>
+                </a:solidFill>
+                <a:latin typeface="Consolas" panose="020B0609020204030204" pitchFamily="49" charset="0"/>
+                <a:cs typeface="Consolas" panose="020B0609020204030204" pitchFamily="49" charset="0"/>
+              </a:rPr>
+              <a:t>normal</a:t>
+            </a:r>
+            <a:r>
+              <a:rPr lang="en-US" sz="1200" dirty="0">
+                <a:latin typeface="Consolas" panose="020B0609020204030204" pitchFamily="49" charset="0"/>
+                <a:cs typeface="Consolas" panose="020B0609020204030204" pitchFamily="49" charset="0"/>
+              </a:rPr>
+              <a:t>(F) :- property(F,_), not special(F).</a:t>
+            </a:r>
+          </a:p>
+          <a:p>
+            <a:endParaRPr lang="en-US" sz="1200" dirty="0">
+              <a:latin typeface="Consolas" panose="020B0609020204030204" pitchFamily="49" charset="0"/>
+              <a:cs typeface="Consolas" panose="020B0609020204030204" pitchFamily="49" charset="0"/>
+            </a:endParaRPr>
+          </a:p>
+          <a:p>
+            <a:r>
+              <a:rPr lang="en-US" sz="1200" dirty="0">
+                <a:solidFill>
+                  <a:schemeClr val="bg1">
+                    <a:lumMod val="50000"/>
+                  </a:schemeClr>
+                </a:solidFill>
+                <a:latin typeface="Courier" pitchFamily="2" charset="0"/>
+                <a:cs typeface="Consolas" panose="020B0609020204030204" pitchFamily="49" charset="0"/>
+              </a:rPr>
+              <a:t>% </a:t>
+            </a:r>
+            <a:r>
+              <a:rPr lang="en-US" sz="1200" dirty="0" err="1">
+                <a:solidFill>
+                  <a:schemeClr val="bg1">
+                    <a:lumMod val="50000"/>
+                  </a:schemeClr>
+                </a:solidFill>
+                <a:latin typeface="Courier" pitchFamily="2" charset="0"/>
+                <a:cs typeface="Consolas" panose="020B0609020204030204" pitchFamily="49" charset="0"/>
+              </a:rPr>
+              <a:t>clingo</a:t>
+            </a:r>
+            <a:r>
+              <a:rPr lang="en-US" sz="1200" dirty="0">
+                <a:solidFill>
+                  <a:schemeClr val="bg1">
+                    <a:lumMod val="50000"/>
+                  </a:schemeClr>
+                </a:solidFill>
+                <a:latin typeface="Courier" pitchFamily="2" charset="0"/>
+                <a:cs typeface="Consolas" panose="020B0609020204030204" pitchFamily="49" charset="0"/>
+              </a:rPr>
+              <a:t> -n0 example4.lp4 unique.lp4 </a:t>
+            </a:r>
+          </a:p>
+          <a:p>
+            <a:r>
+              <a:rPr lang="en-US" sz="1200" b="1" dirty="0">
+                <a:solidFill>
+                  <a:schemeClr val="bg1">
+                    <a:lumMod val="50000"/>
+                  </a:schemeClr>
+                </a:solidFill>
+                <a:latin typeface="Courier" pitchFamily="2" charset="0"/>
+                <a:cs typeface="Consolas" panose="020B0609020204030204" pitchFamily="49" charset="0"/>
+              </a:rPr>
+              <a:t>unique(fig1,small) </a:t>
+            </a:r>
+          </a:p>
+          <a:p>
+            <a:r>
+              <a:rPr lang="en-US" sz="1200" b="1" dirty="0">
+                <a:solidFill>
+                  <a:schemeClr val="bg1">
+                    <a:lumMod val="50000"/>
+                  </a:schemeClr>
+                </a:solidFill>
+                <a:latin typeface="Courier" pitchFamily="2" charset="0"/>
+                <a:cs typeface="Consolas" panose="020B0609020204030204" pitchFamily="49" charset="0"/>
+              </a:rPr>
+              <a:t>unique(fig2,green) </a:t>
+            </a:r>
+          </a:p>
+          <a:p>
+            <a:r>
+              <a:rPr lang="en-US" sz="1200" b="1" dirty="0">
+                <a:solidFill>
+                  <a:schemeClr val="bg1">
+                    <a:lumMod val="50000"/>
+                  </a:schemeClr>
+                </a:solidFill>
+                <a:latin typeface="Courier" pitchFamily="2" charset="0"/>
+                <a:cs typeface="Consolas" panose="020B0609020204030204" pitchFamily="49" charset="0"/>
+              </a:rPr>
+              <a:t>unique(fig3,circle)</a:t>
+            </a:r>
+          </a:p>
+          <a:p>
+            <a:r>
+              <a:rPr lang="en-US" sz="1200" b="1" dirty="0">
+                <a:solidFill>
+                  <a:srgbClr val="0432FF"/>
+                </a:solidFill>
+                <a:latin typeface="Consolas" panose="020B0609020204030204" pitchFamily="49" charset="0"/>
+                <a:cs typeface="Consolas" panose="020B0609020204030204" pitchFamily="49" charset="0"/>
+              </a:rPr>
+              <a:t>special(fig1) </a:t>
+            </a:r>
+          </a:p>
+          <a:p>
+            <a:r>
+              <a:rPr lang="en-US" sz="1200" b="1" dirty="0">
+                <a:solidFill>
+                  <a:srgbClr val="0432FF"/>
+                </a:solidFill>
+                <a:latin typeface="Consolas" panose="020B0609020204030204" pitchFamily="49" charset="0"/>
+                <a:cs typeface="Consolas" panose="020B0609020204030204" pitchFamily="49" charset="0"/>
+              </a:rPr>
+              <a:t>special(fig2) </a:t>
+            </a:r>
+          </a:p>
+          <a:p>
+            <a:r>
+              <a:rPr lang="en-US" sz="1200" b="1" dirty="0">
+                <a:solidFill>
+                  <a:srgbClr val="0432FF"/>
+                </a:solidFill>
+                <a:latin typeface="Consolas" panose="020B0609020204030204" pitchFamily="49" charset="0"/>
+                <a:cs typeface="Consolas" panose="020B0609020204030204" pitchFamily="49" charset="0"/>
+              </a:rPr>
+              <a:t>special(fig3)</a:t>
+            </a:r>
+          </a:p>
+          <a:p>
+            <a:r>
+              <a:rPr lang="en-US" sz="1200" b="1" dirty="0">
+                <a:solidFill>
+                  <a:srgbClr val="FF0000"/>
+                </a:solidFill>
+                <a:latin typeface="Consolas" panose="020B0609020204030204" pitchFamily="49" charset="0"/>
+                <a:cs typeface="Consolas" panose="020B0609020204030204" pitchFamily="49" charset="0"/>
+              </a:rPr>
+              <a:t>normal(fig4) </a:t>
+            </a:r>
+          </a:p>
+          <a:p>
+            <a:endParaRPr lang="en-US" sz="1200" b="1" dirty="0">
+              <a:solidFill>
+                <a:schemeClr val="bg1">
+                  <a:lumMod val="50000"/>
+                </a:schemeClr>
+              </a:solidFill>
+              <a:latin typeface="Courier" pitchFamily="2" charset="0"/>
+              <a:cs typeface="Consolas" panose="020B0609020204030204" pitchFamily="49" charset="0"/>
+            </a:endParaRPr>
+          </a:p>
+        </p:txBody>
+      </p:sp>
+      <p:sp>
+        <p:nvSpPr>
+          <p:cNvPr id="4" name="Title 3">
+            <a:extLst>
+              <a:ext uri="{FF2B5EF4-FFF2-40B4-BE49-F238E27FC236}">
+                <a16:creationId xmlns:a16="http://schemas.microsoft.com/office/drawing/2014/main" id="{47815922-51F6-084B-B251-636949D6694B}"/>
+              </a:ext>
+            </a:extLst>
+          </p:cNvPr>
+          <p:cNvSpPr>
+            <a:spLocks noGrp="1"/>
+          </p:cNvSpPr>
+          <p:nvPr>
+            <p:ph type="title"/>
+          </p:nvPr>
+        </p:nvSpPr>
+        <p:spPr>
+          <a:xfrm>
+            <a:off x="838200" y="115380"/>
+            <a:ext cx="10515600" cy="1325563"/>
+          </a:xfrm>
+        </p:spPr>
+        <p:txBody>
+          <a:bodyPr>
+            <a:normAutofit fontScale="90000"/>
+          </a:bodyPr>
+          <a:lstStyle/>
+          <a:p>
+            <a:r>
+              <a:rPr lang="en-US" dirty="0"/>
+              <a:t>Example 4: </a:t>
+            </a:r>
+            <a:r>
+              <a:rPr lang="en-US" sz="3600" dirty="0"/>
+              <a:t>... if (almost) everyone is special, who really does stand out? The only “</a:t>
+            </a:r>
+            <a:r>
+              <a:rPr lang="en-US" sz="3600" dirty="0" err="1"/>
+              <a:t>unspecial</a:t>
+            </a:r>
+            <a:r>
+              <a:rPr lang="en-US" sz="3600" dirty="0"/>
+              <a:t>” or “most normal” figure!</a:t>
+            </a:r>
+            <a:endParaRPr lang="en-US" dirty="0"/>
+          </a:p>
+        </p:txBody>
+      </p:sp>
+    </p:spTree>
+    <p:extLst>
+      <p:ext uri="{BB962C8B-B14F-4D97-AF65-F5344CB8AC3E}">
+        <p14:creationId xmlns:p14="http://schemas.microsoft.com/office/powerpoint/2010/main" val="1782839240"/>
+      </p:ext>
+    </p:extLst>
+  </p:cSld>
+  <p:clrMapOvr>
+    <a:masterClrMapping/>
+  </p:clrMapOvr>
+  <p:timing>
+    <p:tnLst>
+      <p:par>
+        <p:cTn id="1" dur="indefinite" restart="never" nodeType="tmRoot">
+          <p:childTnLst>
+            <p:seq concurrent="1" nextAc="seek">
+              <p:cTn id="2" dur="indefinite" nodeType="mainSeq">
+                <p:childTnLst>
+                  <p:par>
+                    <p:cTn id="3" fill="hold">
+                      <p:stCondLst>
+                        <p:cond delay="indefinite"/>
+                      </p:stCondLst>
+                      <p:childTnLst>
+                        <p:par>
+                          <p:cTn id="4" fill="hold">
+                            <p:stCondLst>
+                              <p:cond delay="0"/>
+                            </p:stCondLst>
+                            <p:childTnLst>
+                              <p:par>
+                                <p:cTn id="5" presetID="9" presetClass="entr" presetSubtype="0" fill="hold" grpId="0" nodeType="clickEffect">
+                                  <p:stCondLst>
+                                    <p:cond delay="0"/>
+                                  </p:stCondLst>
+                                  <p:childTnLst>
+                                    <p:set>
+                                      <p:cBhvr>
+                                        <p:cTn id="6" dur="1" fill="hold">
+                                          <p:stCondLst>
+                                            <p:cond delay="0"/>
+                                          </p:stCondLst>
+                                        </p:cTn>
+                                        <p:tgtEl>
+                                          <p:spTgt spid="2"/>
+                                        </p:tgtEl>
+                                        <p:attrNameLst>
+                                          <p:attrName>style.visibility</p:attrName>
+                                        </p:attrNameLst>
+                                      </p:cBhvr>
+                                      <p:to>
+                                        <p:strVal val="visible"/>
+                                      </p:to>
+                                    </p:set>
+                                    <p:animEffect transition="in" filter="dissolve">
+                                      <p:cBhvr>
+                                        <p:cTn id="7" dur="500"/>
+                                        <p:tgtEl>
+                                          <p:spTgt spid="2"/>
+                                        </p:tgtEl>
+                                      </p:cBhvr>
+                                    </p:animEffect>
+                                  </p:childTnLst>
+                                </p:cTn>
+                              </p:par>
+                            </p:childTnLst>
+                          </p:cTn>
+                        </p:par>
+                      </p:childTnLst>
+                    </p:cTn>
+                  </p:par>
+                  <p:par>
+                    <p:cTn id="8" fill="hold">
+                      <p:stCondLst>
+                        <p:cond delay="indefinite"/>
+                      </p:stCondLst>
+                      <p:childTnLst>
+                        <p:par>
+                          <p:cTn id="9" fill="hold">
+                            <p:stCondLst>
+                              <p:cond delay="0"/>
+                            </p:stCondLst>
+                            <p:childTnLst>
+                              <p:par>
+                                <p:cTn id="10" presetID="9" presetClass="entr" presetSubtype="0" fill="hold" grpId="0" nodeType="clickEffect">
+                                  <p:stCondLst>
+                                    <p:cond delay="0"/>
+                                  </p:stCondLst>
+                                  <p:childTnLst>
+                                    <p:set>
+                                      <p:cBhvr>
+                                        <p:cTn id="11" dur="1" fill="hold">
+                                          <p:stCondLst>
+                                            <p:cond delay="0"/>
+                                          </p:stCondLst>
+                                        </p:cTn>
+                                        <p:tgtEl>
+                                          <p:spTgt spid="24"/>
+                                        </p:tgtEl>
+                                        <p:attrNameLst>
+                                          <p:attrName>style.visibility</p:attrName>
+                                        </p:attrNameLst>
+                                      </p:cBhvr>
+                                      <p:to>
+                                        <p:strVal val="visible"/>
+                                      </p:to>
+                                    </p:set>
+                                    <p:animEffect transition="in" filter="dissolve">
+                                      <p:cBhvr>
+                                        <p:cTn id="12" dur="500"/>
+                                        <p:tgtEl>
+                                          <p:spTgt spid="24"/>
+                                        </p:tgtEl>
+                                      </p:cBhvr>
+                                    </p:animEffect>
+                                  </p:childTnLst>
+                                </p:cTn>
+                              </p:par>
+                            </p:childTnLst>
+                          </p:cTn>
+                        </p:par>
+                      </p:childTnLst>
+                    </p:cTn>
+                  </p:par>
+                </p:childTnLst>
+              </p:cTn>
+              <p:prevCondLst>
+                <p:cond evt="onPrev" delay="0">
+                  <p:tgtEl>
+                    <p:sldTgt/>
+                  </p:tgtEl>
+                </p:cond>
+              </p:prevCondLst>
+              <p:nextCondLst>
+                <p:cond evt="onNext" delay="0">
+                  <p:tgtEl>
+                    <p:sldTgt/>
+                  </p:tgtEl>
+                </p:cond>
+              </p:nextCondLst>
+            </p:seq>
+          </p:childTnLst>
+        </p:cTn>
+      </p:par>
+    </p:tnLst>
+    <p:bldLst>
+      <p:bldP spid="2" grpId="0"/>
+      <p:bldP spid="24" grpId="0"/>
+    </p:bldLst>
+  </p:timing>
+</p:sld>
+</file>
+
+<file path=ppt/slides/slide11.xml><?xml version="1.0" encoding="utf-8"?>
+<p:sld xmlns:a="http://schemas.openxmlformats.org/drawingml/2006/main" xmlns:r="http://schemas.openxmlformats.org/officeDocument/2006/relationships" xmlns:p="http://schemas.openxmlformats.org/presentationml/2006/main">
+  <p:cSld>
+    <p:spTree>
+      <p:nvGrpSpPr>
+        <p:cNvPr id="1" name=""/>
+        <p:cNvGrpSpPr/>
+        <p:nvPr/>
+      </p:nvGrpSpPr>
+      <p:grpSpPr>
+        <a:xfrm>
+          <a:off x="0" y="0"/>
+          <a:ext cx="0" cy="0"/>
+          <a:chOff x="0" y="0"/>
+          <a:chExt cx="0" cy="0"/>
+        </a:xfrm>
+      </p:grpSpPr>
       <p:sp>
         <p:nvSpPr>
           <p:cNvPr id="2" name="Title 1">
@@ -5142,7 +6244,7 @@
 </p:sld>
 </file>
 
-<file path=ppt/slides/slide11.xml><?xml version="1.0" encoding="utf-8"?>
+<file path=ppt/slides/slide12.xml><?xml version="1.0" encoding="utf-8"?>
 <p:sld xmlns:a="http://schemas.openxmlformats.org/drawingml/2006/main" xmlns:r="http://schemas.openxmlformats.org/officeDocument/2006/relationships" xmlns:p="http://schemas.openxmlformats.org/presentationml/2006/main">
   <p:cSld>
     <p:spTree>
@@ -6276,7 +7378,7 @@
 </p:sld>
 </file>
 
-<file path=ppt/slides/slide12.xml><?xml version="1.0" encoding="utf-8"?>
+<file path=ppt/slides/slide13.xml><?xml version="1.0" encoding="utf-8"?>
 <p:sld xmlns:a="http://schemas.openxmlformats.org/drawingml/2006/main" xmlns:r="http://schemas.openxmlformats.org/officeDocument/2006/relationships" xmlns:p="http://schemas.openxmlformats.org/presentationml/2006/main">
   <p:cSld>
     <p:spTree>
@@ -7125,7 +8227,7 @@
 </p:sld>
 </file>
 
-<file path=ppt/slides/slide13.xml><?xml version="1.0" encoding="utf-8"?>
+<file path=ppt/slides/slide14.xml><?xml version="1.0" encoding="utf-8"?>
 <p:sld xmlns:a="http://schemas.openxmlformats.org/drawingml/2006/main" xmlns:r="http://schemas.openxmlformats.org/officeDocument/2006/relationships" xmlns:p="http://schemas.openxmlformats.org/presentationml/2006/main">
   <p:cSld>
     <p:spTree>
@@ -8675,7 +9777,7 @@
 </p:sld>
 </file>
 
-<file path=ppt/slides/slide14.xml><?xml version="1.0" encoding="utf-8"?>
+<file path=ppt/slides/slide15.xml><?xml version="1.0" encoding="utf-8"?>
 <p:sld xmlns:a="http://schemas.openxmlformats.org/drawingml/2006/main" xmlns:r="http://schemas.openxmlformats.org/officeDocument/2006/relationships" xmlns:p="http://schemas.openxmlformats.org/presentationml/2006/main">
   <p:cSld>
     <p:spTree>
@@ -8836,7 +9938,7 @@
 </p:sld>
 </file>
 
-<file path=ppt/slides/slide15.xml><?xml version="1.0" encoding="utf-8"?>
+<file path=ppt/slides/slide16.xml><?xml version="1.0" encoding="utf-8"?>
 <p:sld xmlns:a="http://schemas.openxmlformats.org/drawingml/2006/main" xmlns:r="http://schemas.openxmlformats.org/officeDocument/2006/relationships" xmlns:p="http://schemas.openxmlformats.org/presentationml/2006/main">
   <p:cSld>
     <p:spTree>
@@ -8866,7 +9968,7 @@
 </p:sld>
 </file>
 
-<file path=ppt/slides/slide16.xml><?xml version="1.0" encoding="utf-8"?>
+<file path=ppt/slides/slide17.xml><?xml version="1.0" encoding="utf-8"?>
 <p:sld xmlns:a="http://schemas.openxmlformats.org/drawingml/2006/main" xmlns:r="http://schemas.openxmlformats.org/officeDocument/2006/relationships" xmlns:p="http://schemas.openxmlformats.org/presentationml/2006/main">
   <p:cSld>
     <p:spTree>
@@ -14026,6 +15128,739 @@
           <a:chExt cx="0" cy="0"/>
         </a:xfrm>
       </p:grpSpPr>
+      <p:sp>
+        <p:nvSpPr>
+          <p:cNvPr id="2" name="TextBox 1">
+            <a:extLst>
+              <a:ext uri="{FF2B5EF4-FFF2-40B4-BE49-F238E27FC236}">
+                <a16:creationId xmlns:a16="http://schemas.microsoft.com/office/drawing/2014/main" id="{3B297FFD-21FA-EB4F-93E9-3342B135EDF9}"/>
+              </a:ext>
+            </a:extLst>
+          </p:cNvPr>
+          <p:cNvSpPr txBox="1"/>
+          <p:nvPr/>
+        </p:nvSpPr>
+        <p:spPr>
+          <a:xfrm>
+            <a:off x="756139" y="1768921"/>
+            <a:ext cx="2155655" cy="4247317"/>
+          </a:xfrm>
+          <a:prstGeom prst="rect">
+            <a:avLst/>
+          </a:prstGeom>
+          <a:noFill/>
+        </p:spPr>
+        <p:txBody>
+          <a:bodyPr wrap="none" rtlCol="0">
+            <a:spAutoFit/>
+          </a:bodyPr>
+          <a:lstStyle/>
+          <a:p>
+            <a:r>
+              <a:rPr lang="en-US" dirty="0"/>
+              <a:t>property(fig1, blue).</a:t>
+            </a:r>
+          </a:p>
+          <a:p>
+            <a:r>
+              <a:rPr lang="en-US" dirty="0"/>
+              <a:t>property(fig1, large).</a:t>
+            </a:r>
+          </a:p>
+          <a:p>
+            <a:r>
+              <a:rPr lang="en-US" dirty="0"/>
+              <a:t>property(fig1, circle).</a:t>
+            </a:r>
+          </a:p>
+          <a:p>
+            <a:endParaRPr lang="en-US" dirty="0"/>
+          </a:p>
+          <a:p>
+            <a:r>
+              <a:rPr lang="en-US" dirty="0"/>
+              <a:t>property(fig2, red).</a:t>
+            </a:r>
+          </a:p>
+          <a:p>
+            <a:r>
+              <a:rPr lang="en-US" dirty="0"/>
+              <a:t>property(fig2, large).</a:t>
+            </a:r>
+          </a:p>
+          <a:p>
+            <a:r>
+              <a:rPr lang="en-US" dirty="0"/>
+              <a:t>property(fig2, box).</a:t>
+            </a:r>
+          </a:p>
+          <a:p>
+            <a:endParaRPr lang="en-US" dirty="0"/>
+          </a:p>
+          <a:p>
+            <a:r>
+              <a:rPr lang="en-US" dirty="0"/>
+              <a:t>property(fig3, red).</a:t>
+            </a:r>
+          </a:p>
+          <a:p>
+            <a:r>
+              <a:rPr lang="en-US" dirty="0"/>
+              <a:t>property(fig3, small).</a:t>
+            </a:r>
+          </a:p>
+          <a:p>
+            <a:r>
+              <a:rPr lang="en-US" dirty="0"/>
+              <a:t>property(fig3, box).</a:t>
+            </a:r>
+          </a:p>
+          <a:p>
+            <a:endParaRPr lang="en-US" dirty="0"/>
+          </a:p>
+          <a:p>
+            <a:r>
+              <a:rPr lang="en-US" dirty="0"/>
+              <a:t>property(fig4, blue).</a:t>
+            </a:r>
+          </a:p>
+          <a:p>
+            <a:r>
+              <a:rPr lang="en-US" dirty="0"/>
+              <a:t>property(fig4, large).</a:t>
+            </a:r>
+          </a:p>
+          <a:p>
+            <a:r>
+              <a:rPr lang="en-US" dirty="0"/>
+              <a:t>property(fig4, box).</a:t>
+            </a:r>
+          </a:p>
+        </p:txBody>
+      </p:sp>
+      <p:sp>
+        <p:nvSpPr>
+          <p:cNvPr id="24" name="TextBox 23">
+            <a:extLst>
+              <a:ext uri="{FF2B5EF4-FFF2-40B4-BE49-F238E27FC236}">
+                <a16:creationId xmlns:a16="http://schemas.microsoft.com/office/drawing/2014/main" id="{90BB4E62-C7CE-444C-B9F7-1DD2BE18B97A}"/>
+              </a:ext>
+            </a:extLst>
+          </p:cNvPr>
+          <p:cNvSpPr txBox="1"/>
+          <p:nvPr/>
+        </p:nvSpPr>
+        <p:spPr>
+          <a:xfrm>
+            <a:off x="4193931" y="4723136"/>
+            <a:ext cx="5991835" cy="1754326"/>
+          </a:xfrm>
+          <a:prstGeom prst="rect">
+            <a:avLst/>
+          </a:prstGeom>
+          <a:noFill/>
+        </p:spPr>
+        <p:txBody>
+          <a:bodyPr wrap="square" rtlCol="0">
+            <a:spAutoFit/>
+          </a:bodyPr>
+          <a:lstStyle/>
+          <a:p>
+            <a:r>
+              <a:rPr lang="en-US" sz="1200" dirty="0">
+                <a:solidFill>
+                  <a:srgbClr val="C00000"/>
+                </a:solidFill>
+                <a:latin typeface="Consolas" panose="020B0609020204030204" pitchFamily="49" charset="0"/>
+                <a:cs typeface="Consolas" panose="020B0609020204030204" pitchFamily="49" charset="0"/>
+              </a:rPr>
+              <a:t>% Fig. X is unique </a:t>
+            </a:r>
+            <a:r>
+              <a:rPr lang="en-US" sz="1200" dirty="0" err="1">
+                <a:solidFill>
+                  <a:srgbClr val="C00000"/>
+                </a:solidFill>
+                <a:latin typeface="Consolas" panose="020B0609020204030204" pitchFamily="49" charset="0"/>
+                <a:cs typeface="Consolas" panose="020B0609020204030204" pitchFamily="49" charset="0"/>
+              </a:rPr>
+              <a:t>wrt</a:t>
+            </a:r>
+            <a:r>
+              <a:rPr lang="en-US" sz="1200" dirty="0">
+                <a:solidFill>
+                  <a:srgbClr val="C00000"/>
+                </a:solidFill>
+                <a:latin typeface="Consolas" panose="020B0609020204030204" pitchFamily="49" charset="0"/>
+                <a:cs typeface="Consolas" panose="020B0609020204030204" pitchFamily="49" charset="0"/>
+              </a:rPr>
+              <a:t> property P and value V, if there is no ..</a:t>
+            </a:r>
+          </a:p>
+          <a:p>
+            <a:r>
+              <a:rPr lang="en-US" sz="1200" b="1" dirty="0">
+                <a:solidFill>
+                  <a:srgbClr val="0432FF"/>
+                </a:solidFill>
+                <a:latin typeface="Consolas" panose="020B0609020204030204" pitchFamily="49" charset="0"/>
+                <a:cs typeface="Consolas" panose="020B0609020204030204" pitchFamily="49" charset="0"/>
+              </a:rPr>
+              <a:t>unique</a:t>
+            </a:r>
+            <a:r>
+              <a:rPr lang="en-US" sz="1200" dirty="0">
+                <a:latin typeface="Consolas" panose="020B0609020204030204" pitchFamily="49" charset="0"/>
+                <a:cs typeface="Consolas" panose="020B0609020204030204" pitchFamily="49" charset="0"/>
+              </a:rPr>
+              <a:t>(F,V) :- property(F,V), </a:t>
+            </a:r>
+            <a:r>
+              <a:rPr lang="en-US" sz="1200" b="1" dirty="0">
+                <a:latin typeface="Consolas" panose="020B0609020204030204" pitchFamily="49" charset="0"/>
+                <a:cs typeface="Consolas" panose="020B0609020204030204" pitchFamily="49" charset="0"/>
+              </a:rPr>
+              <a:t>not</a:t>
+            </a:r>
+            <a:r>
+              <a:rPr lang="en-US" sz="1200" dirty="0">
+                <a:latin typeface="Consolas" panose="020B0609020204030204" pitchFamily="49" charset="0"/>
+                <a:cs typeface="Consolas" panose="020B0609020204030204" pitchFamily="49" charset="0"/>
+              </a:rPr>
+              <a:t> </a:t>
+            </a:r>
+            <a:r>
+              <a:rPr lang="en-US" sz="1200" dirty="0" err="1">
+                <a:latin typeface="Consolas" panose="020B0609020204030204" pitchFamily="49" charset="0"/>
+                <a:cs typeface="Consolas" panose="020B0609020204030204" pitchFamily="49" charset="0"/>
+              </a:rPr>
+              <a:t>exists_diff</a:t>
+            </a:r>
+            <a:r>
+              <a:rPr lang="en-US" sz="1200" dirty="0">
+                <a:latin typeface="Consolas" panose="020B0609020204030204" pitchFamily="49" charset="0"/>
+                <a:cs typeface="Consolas" panose="020B0609020204030204" pitchFamily="49" charset="0"/>
+              </a:rPr>
+              <a:t>(F,V).</a:t>
+            </a:r>
+          </a:p>
+          <a:p>
+            <a:endParaRPr lang="en-US" sz="1200" dirty="0">
+              <a:latin typeface="Consolas" panose="020B0609020204030204" pitchFamily="49" charset="0"/>
+              <a:cs typeface="Consolas" panose="020B0609020204030204" pitchFamily="49" charset="0"/>
+            </a:endParaRPr>
+          </a:p>
+          <a:p>
+            <a:r>
+              <a:rPr lang="en-US" sz="1200" dirty="0">
+                <a:solidFill>
+                  <a:srgbClr val="C00000"/>
+                </a:solidFill>
+                <a:latin typeface="Consolas" panose="020B0609020204030204" pitchFamily="49" charset="0"/>
+                <a:cs typeface="Consolas" panose="020B0609020204030204" pitchFamily="49" charset="0"/>
+              </a:rPr>
+              <a:t>% .. other figure Y that has the same property/value pair: </a:t>
+            </a:r>
+          </a:p>
+          <a:p>
+            <a:r>
+              <a:rPr lang="en-US" sz="1200" b="1" dirty="0" err="1">
+                <a:solidFill>
+                  <a:srgbClr val="0432FF"/>
+                </a:solidFill>
+                <a:latin typeface="Consolas" panose="020B0609020204030204" pitchFamily="49" charset="0"/>
+                <a:cs typeface="Consolas" panose="020B0609020204030204" pitchFamily="49" charset="0"/>
+              </a:rPr>
+              <a:t>exists_diff</a:t>
+            </a:r>
+            <a:r>
+              <a:rPr lang="en-US" sz="1200" dirty="0">
+                <a:latin typeface="Consolas" panose="020B0609020204030204" pitchFamily="49" charset="0"/>
+                <a:cs typeface="Consolas" panose="020B0609020204030204" pitchFamily="49" charset="0"/>
+              </a:rPr>
+              <a:t>(F,V) :- property(F,V), property(F2,V), F != F2. </a:t>
+            </a:r>
+          </a:p>
+          <a:p>
+            <a:endParaRPr lang="en-US" sz="1200" dirty="0">
+              <a:latin typeface="Consolas" panose="020B0609020204030204" pitchFamily="49" charset="0"/>
+              <a:cs typeface="Consolas" panose="020B0609020204030204" pitchFamily="49" charset="0"/>
+            </a:endParaRPr>
+          </a:p>
+          <a:p>
+            <a:r>
+              <a:rPr lang="en-US" sz="1200" dirty="0">
+                <a:solidFill>
+                  <a:schemeClr val="bg1">
+                    <a:lumMod val="50000"/>
+                  </a:schemeClr>
+                </a:solidFill>
+                <a:latin typeface="Courier" pitchFamily="2" charset="0"/>
+                <a:cs typeface="Consolas" panose="020B0609020204030204" pitchFamily="49" charset="0"/>
+              </a:rPr>
+              <a:t>% </a:t>
+            </a:r>
+            <a:r>
+              <a:rPr lang="en-US" sz="1200" dirty="0" err="1">
+                <a:solidFill>
+                  <a:schemeClr val="bg1">
+                    <a:lumMod val="50000"/>
+                  </a:schemeClr>
+                </a:solidFill>
+                <a:latin typeface="Courier" pitchFamily="2" charset="0"/>
+                <a:cs typeface="Consolas" panose="020B0609020204030204" pitchFamily="49" charset="0"/>
+              </a:rPr>
+              <a:t>clingo</a:t>
+            </a:r>
+            <a:r>
+              <a:rPr lang="en-US" sz="1200" dirty="0">
+                <a:solidFill>
+                  <a:schemeClr val="bg1">
+                    <a:lumMod val="50000"/>
+                  </a:schemeClr>
+                </a:solidFill>
+                <a:latin typeface="Courier" pitchFamily="2" charset="0"/>
+                <a:cs typeface="Consolas" panose="020B0609020204030204" pitchFamily="49" charset="0"/>
+              </a:rPr>
+              <a:t> -n0 example3.lp4 unique.lp4 </a:t>
+            </a:r>
+          </a:p>
+          <a:p>
+            <a:r>
+              <a:rPr lang="en-US" sz="1200" b="1" dirty="0">
+                <a:solidFill>
+                  <a:schemeClr val="bg1">
+                    <a:lumMod val="50000"/>
+                  </a:schemeClr>
+                </a:solidFill>
+                <a:latin typeface="Courier" pitchFamily="2" charset="0"/>
+                <a:cs typeface="Consolas" panose="020B0609020204030204" pitchFamily="49" charset="0"/>
+              </a:rPr>
+              <a:t>unique(fig1,small) </a:t>
+            </a:r>
+          </a:p>
+          <a:p>
+            <a:r>
+              <a:rPr lang="en-US" sz="1200" b="1" dirty="0">
+                <a:solidFill>
+                  <a:schemeClr val="bg1">
+                    <a:lumMod val="50000"/>
+                  </a:schemeClr>
+                </a:solidFill>
+                <a:latin typeface="Courier" pitchFamily="2" charset="0"/>
+                <a:cs typeface="Consolas" panose="020B0609020204030204" pitchFamily="49" charset="0"/>
+              </a:rPr>
+              <a:t>unique(fig3,circle)</a:t>
+            </a:r>
+          </a:p>
+        </p:txBody>
+      </p:sp>
+      <p:sp>
+        <p:nvSpPr>
+          <p:cNvPr id="4" name="Title 3">
+            <a:extLst>
+              <a:ext uri="{FF2B5EF4-FFF2-40B4-BE49-F238E27FC236}">
+                <a16:creationId xmlns:a16="http://schemas.microsoft.com/office/drawing/2014/main" id="{DACECA17-F28A-D34C-A18A-1B1D31320F45}"/>
+              </a:ext>
+            </a:extLst>
+          </p:cNvPr>
+          <p:cNvSpPr>
+            <a:spLocks noGrp="1"/>
+          </p:cNvSpPr>
+          <p:nvPr>
+            <p:ph type="title"/>
+          </p:nvPr>
+        </p:nvSpPr>
+        <p:spPr/>
+        <p:txBody>
+          <a:bodyPr/>
+          <a:lstStyle/>
+          <a:p>
+            <a:r>
+              <a:rPr lang="en-US" dirty="0"/>
+              <a:t>Example 3: circle/small, blue/red, large/box</a:t>
+            </a:r>
+          </a:p>
+        </p:txBody>
+      </p:sp>
+      <p:sp>
+        <p:nvSpPr>
+          <p:cNvPr id="18" name="Rectangle 17">
+            <a:extLst>
+              <a:ext uri="{FF2B5EF4-FFF2-40B4-BE49-F238E27FC236}">
+                <a16:creationId xmlns:a16="http://schemas.microsoft.com/office/drawing/2014/main" id="{E919A414-0B6D-4547-BD11-A0C894CB86E6}"/>
+              </a:ext>
+            </a:extLst>
+          </p:cNvPr>
+          <p:cNvSpPr/>
+          <p:nvPr/>
+        </p:nvSpPr>
+        <p:spPr>
+          <a:xfrm>
+            <a:off x="9804076" y="3341786"/>
+            <a:ext cx="366181" cy="366181"/>
+          </a:xfrm>
+          <a:prstGeom prst="rect">
+            <a:avLst/>
+          </a:prstGeom>
+          <a:solidFill>
+            <a:srgbClr val="FF0000"/>
+          </a:solidFill>
+        </p:spPr>
+        <p:style>
+          <a:lnRef idx="2">
+            <a:schemeClr val="accent1">
+              <a:shade val="50000"/>
+            </a:schemeClr>
+          </a:lnRef>
+          <a:fillRef idx="1">
+            <a:schemeClr val="accent1"/>
+          </a:fillRef>
+          <a:effectRef idx="0">
+            <a:schemeClr val="accent1"/>
+          </a:effectRef>
+          <a:fontRef idx="minor">
+            <a:schemeClr val="lt1"/>
+          </a:fontRef>
+        </p:style>
+        <p:txBody>
+          <a:bodyPr rtlCol="0" anchor="ctr"/>
+          <a:lstStyle/>
+          <a:p>
+            <a:pPr algn="ctr"/>
+            <a:r>
+              <a:rPr lang="en-US" sz="1000" dirty="0"/>
+              <a:t>3/1</a:t>
+            </a:r>
+          </a:p>
+        </p:txBody>
+      </p:sp>
+      <p:sp>
+        <p:nvSpPr>
+          <p:cNvPr id="19" name="Oval 18">
+            <a:extLst>
+              <a:ext uri="{FF2B5EF4-FFF2-40B4-BE49-F238E27FC236}">
+                <a16:creationId xmlns:a16="http://schemas.microsoft.com/office/drawing/2014/main" id="{401CFBA3-8D75-3940-BB62-10368B5B474B}"/>
+              </a:ext>
+            </a:extLst>
+          </p:cNvPr>
+          <p:cNvSpPr/>
+          <p:nvPr/>
+        </p:nvSpPr>
+        <p:spPr>
+          <a:xfrm>
+            <a:off x="9630044" y="2191652"/>
+            <a:ext cx="712382" cy="712382"/>
+          </a:xfrm>
+          <a:prstGeom prst="ellipse">
+            <a:avLst/>
+          </a:prstGeom>
+          <a:solidFill>
+            <a:srgbClr val="0432FF"/>
+          </a:solidFill>
+        </p:spPr>
+        <p:style>
+          <a:lnRef idx="2">
+            <a:schemeClr val="accent1">
+              <a:shade val="50000"/>
+            </a:schemeClr>
+          </a:lnRef>
+          <a:fillRef idx="1">
+            <a:schemeClr val="accent1"/>
+          </a:fillRef>
+          <a:effectRef idx="0">
+            <a:schemeClr val="accent1"/>
+          </a:effectRef>
+          <a:fontRef idx="minor">
+            <a:schemeClr val="lt1"/>
+          </a:fontRef>
+        </p:style>
+        <p:txBody>
+          <a:bodyPr rtlCol="0" anchor="ctr"/>
+          <a:lstStyle/>
+          <a:p>
+            <a:pPr algn="ctr"/>
+            <a:r>
+              <a:rPr lang="en-US" dirty="0"/>
+              <a:t>1/3</a:t>
+            </a:r>
+          </a:p>
+        </p:txBody>
+      </p:sp>
+      <p:sp>
+        <p:nvSpPr>
+          <p:cNvPr id="20" name="Rectangle 19">
+            <a:extLst>
+              <a:ext uri="{FF2B5EF4-FFF2-40B4-BE49-F238E27FC236}">
+                <a16:creationId xmlns:a16="http://schemas.microsoft.com/office/drawing/2014/main" id="{2C38C0DF-005F-AE4E-98C3-BF75F16E88B3}"/>
+              </a:ext>
+            </a:extLst>
+          </p:cNvPr>
+          <p:cNvSpPr/>
+          <p:nvPr/>
+        </p:nvSpPr>
+        <p:spPr>
+          <a:xfrm>
+            <a:off x="10923714" y="2191653"/>
+            <a:ext cx="712381" cy="712381"/>
+          </a:xfrm>
+          <a:prstGeom prst="rect">
+            <a:avLst/>
+          </a:prstGeom>
+          <a:solidFill>
+            <a:srgbClr val="FF0000"/>
+          </a:solidFill>
+        </p:spPr>
+        <p:style>
+          <a:lnRef idx="2">
+            <a:schemeClr val="accent1">
+              <a:shade val="50000"/>
+            </a:schemeClr>
+          </a:lnRef>
+          <a:fillRef idx="1">
+            <a:schemeClr val="accent1"/>
+          </a:fillRef>
+          <a:effectRef idx="0">
+            <a:schemeClr val="accent1"/>
+          </a:effectRef>
+          <a:fontRef idx="minor">
+            <a:schemeClr val="lt1"/>
+          </a:fontRef>
+        </p:style>
+        <p:txBody>
+          <a:bodyPr rtlCol="0" anchor="ctr"/>
+          <a:lstStyle/>
+          <a:p>
+            <a:pPr algn="ctr"/>
+            <a:r>
+              <a:rPr lang="en-US" dirty="0"/>
+              <a:t>2/4</a:t>
+            </a:r>
+          </a:p>
+        </p:txBody>
+      </p:sp>
+      <p:sp>
+        <p:nvSpPr>
+          <p:cNvPr id="21" name="Rectangle 20">
+            <a:extLst>
+              <a:ext uri="{FF2B5EF4-FFF2-40B4-BE49-F238E27FC236}">
+                <a16:creationId xmlns:a16="http://schemas.microsoft.com/office/drawing/2014/main" id="{25F53DE6-DE2C-C24A-9F6C-7A8B99D95558}"/>
+              </a:ext>
+            </a:extLst>
+          </p:cNvPr>
+          <p:cNvSpPr/>
+          <p:nvPr/>
+        </p:nvSpPr>
+        <p:spPr>
+          <a:xfrm>
+            <a:off x="10923713" y="3171825"/>
+            <a:ext cx="712381" cy="706102"/>
+          </a:xfrm>
+          <a:prstGeom prst="rect">
+            <a:avLst/>
+          </a:prstGeom>
+          <a:solidFill>
+            <a:srgbClr val="0432FF"/>
+          </a:solidFill>
+        </p:spPr>
+        <p:style>
+          <a:lnRef idx="2">
+            <a:schemeClr val="accent1">
+              <a:shade val="50000"/>
+            </a:schemeClr>
+          </a:lnRef>
+          <a:fillRef idx="1">
+            <a:schemeClr val="accent1"/>
+          </a:fillRef>
+          <a:effectRef idx="0">
+            <a:schemeClr val="accent1"/>
+          </a:effectRef>
+          <a:fontRef idx="minor">
+            <a:schemeClr val="lt1"/>
+          </a:fontRef>
+        </p:style>
+        <p:txBody>
+          <a:bodyPr rtlCol="0" anchor="ctr"/>
+          <a:lstStyle/>
+          <a:p>
+            <a:pPr algn="ctr"/>
+            <a:r>
+              <a:rPr lang="en-US" dirty="0"/>
+              <a:t>4/2</a:t>
+            </a:r>
+          </a:p>
+        </p:txBody>
+      </p:sp>
+    </p:spTree>
+    <p:extLst>
+      <p:ext uri="{BB962C8B-B14F-4D97-AF65-F5344CB8AC3E}">
+        <p14:creationId xmlns:p14="http://schemas.microsoft.com/office/powerpoint/2010/main" val="3824509961"/>
+      </p:ext>
+    </p:extLst>
+  </p:cSld>
+  <p:clrMapOvr>
+    <a:masterClrMapping/>
+  </p:clrMapOvr>
+  <p:timing>
+    <p:tnLst>
+      <p:par>
+        <p:cTn id="1" dur="indefinite" restart="never" nodeType="tmRoot">
+          <p:childTnLst>
+            <p:seq concurrent="1" nextAc="seek">
+              <p:cTn id="2" dur="indefinite" nodeType="mainSeq">
+                <p:childTnLst>
+                  <p:par>
+                    <p:cTn id="3" fill="hold">
+                      <p:stCondLst>
+                        <p:cond delay="indefinite"/>
+                      </p:stCondLst>
+                      <p:childTnLst>
+                        <p:par>
+                          <p:cTn id="4" fill="hold">
+                            <p:stCondLst>
+                              <p:cond delay="0"/>
+                            </p:stCondLst>
+                            <p:childTnLst>
+                              <p:par>
+                                <p:cTn id="5" presetID="9" presetClass="entr" presetSubtype="0" fill="hold" grpId="0" nodeType="clickEffect">
+                                  <p:stCondLst>
+                                    <p:cond delay="0"/>
+                                  </p:stCondLst>
+                                  <p:childTnLst>
+                                    <p:set>
+                                      <p:cBhvr>
+                                        <p:cTn id="6" dur="1" fill="hold">
+                                          <p:stCondLst>
+                                            <p:cond delay="0"/>
+                                          </p:stCondLst>
+                                        </p:cTn>
+                                        <p:tgtEl>
+                                          <p:spTgt spid="2"/>
+                                        </p:tgtEl>
+                                        <p:attrNameLst>
+                                          <p:attrName>style.visibility</p:attrName>
+                                        </p:attrNameLst>
+                                      </p:cBhvr>
+                                      <p:to>
+                                        <p:strVal val="visible"/>
+                                      </p:to>
+                                    </p:set>
+                                    <p:animEffect transition="in" filter="dissolve">
+                                      <p:cBhvr>
+                                        <p:cTn id="7" dur="500"/>
+                                        <p:tgtEl>
+                                          <p:spTgt spid="2"/>
+                                        </p:tgtEl>
+                                      </p:cBhvr>
+                                    </p:animEffect>
+                                  </p:childTnLst>
+                                </p:cTn>
+                              </p:par>
+                            </p:childTnLst>
+                          </p:cTn>
+                        </p:par>
+                      </p:childTnLst>
+                    </p:cTn>
+                  </p:par>
+                  <p:par>
+                    <p:cTn id="8" fill="hold">
+                      <p:stCondLst>
+                        <p:cond delay="indefinite"/>
+                      </p:stCondLst>
+                      <p:childTnLst>
+                        <p:par>
+                          <p:cTn id="9" fill="hold">
+                            <p:stCondLst>
+                              <p:cond delay="0"/>
+                            </p:stCondLst>
+                            <p:childTnLst>
+                              <p:par>
+                                <p:cTn id="10" presetID="9" presetClass="entr" presetSubtype="0" fill="hold" grpId="0" nodeType="clickEffect">
+                                  <p:stCondLst>
+                                    <p:cond delay="0"/>
+                                  </p:stCondLst>
+                                  <p:childTnLst>
+                                    <p:set>
+                                      <p:cBhvr>
+                                        <p:cTn id="11" dur="1" fill="hold">
+                                          <p:stCondLst>
+                                            <p:cond delay="0"/>
+                                          </p:stCondLst>
+                                        </p:cTn>
+                                        <p:tgtEl>
+                                          <p:spTgt spid="24"/>
+                                        </p:tgtEl>
+                                        <p:attrNameLst>
+                                          <p:attrName>style.visibility</p:attrName>
+                                        </p:attrNameLst>
+                                      </p:cBhvr>
+                                      <p:to>
+                                        <p:strVal val="visible"/>
+                                      </p:to>
+                                    </p:set>
+                                    <p:animEffect transition="in" filter="dissolve">
+                                      <p:cBhvr>
+                                        <p:cTn id="12" dur="500"/>
+                                        <p:tgtEl>
+                                          <p:spTgt spid="24"/>
+                                        </p:tgtEl>
+                                      </p:cBhvr>
+                                    </p:animEffect>
+                                  </p:childTnLst>
+                                </p:cTn>
+                              </p:par>
+                            </p:childTnLst>
+                          </p:cTn>
+                        </p:par>
+                      </p:childTnLst>
+                    </p:cTn>
+                  </p:par>
+                </p:childTnLst>
+              </p:cTn>
+              <p:prevCondLst>
+                <p:cond evt="onPrev" delay="0">
+                  <p:tgtEl>
+                    <p:sldTgt/>
+                  </p:tgtEl>
+                </p:cond>
+              </p:prevCondLst>
+              <p:nextCondLst>
+                <p:cond evt="onNext" delay="0">
+                  <p:tgtEl>
+                    <p:sldTgt/>
+                  </p:tgtEl>
+                </p:cond>
+              </p:nextCondLst>
+            </p:seq>
+          </p:childTnLst>
+        </p:cTn>
+      </p:par>
+    </p:tnLst>
+    <p:bldLst>
+      <p:bldP spid="2" grpId="0"/>
+      <p:bldP spid="24" grpId="0"/>
+    </p:bldLst>
+  </p:timing>
+</p:sld>
+</file>
+
+<file path=ppt/slides/slide9.xml><?xml version="1.0" encoding="utf-8"?>
+<p:sld xmlns:a="http://schemas.openxmlformats.org/drawingml/2006/main" xmlns:r="http://schemas.openxmlformats.org/officeDocument/2006/relationships" xmlns:p="http://schemas.openxmlformats.org/presentationml/2006/main">
+  <p:cSld>
+    <p:spTree>
+      <p:nvGrpSpPr>
+        <p:cNvPr id="1" name=""/>
+        <p:cNvGrpSpPr/>
+        <p:nvPr/>
+      </p:nvGrpSpPr>
+      <p:grpSpPr>
+        <a:xfrm>
+          <a:off x="0" y="0"/>
+          <a:ext cx="0" cy="0"/>
+          <a:chOff x="0" y="0"/>
+          <a:chExt cx="0" cy="0"/>
+        </a:xfrm>
+      </p:grpSpPr>
       <p:grpSp>
         <p:nvGrpSpPr>
           <p:cNvPr id="3" name="Group 2">
@@ -14632,921 +16467,6 @@
     <p:extLst>
       <p:ext uri="{BB962C8B-B14F-4D97-AF65-F5344CB8AC3E}">
         <p14:creationId xmlns:p14="http://schemas.microsoft.com/office/powerpoint/2010/main" val="2181518183"/>
-      </p:ext>
-    </p:extLst>
-  </p:cSld>
-  <p:clrMapOvr>
-    <a:masterClrMapping/>
-  </p:clrMapOvr>
-  <p:timing>
-    <p:tnLst>
-      <p:par>
-        <p:cTn id="1" dur="indefinite" restart="never" nodeType="tmRoot">
-          <p:childTnLst>
-            <p:seq concurrent="1" nextAc="seek">
-              <p:cTn id="2" dur="indefinite" nodeType="mainSeq">
-                <p:childTnLst>
-                  <p:par>
-                    <p:cTn id="3" fill="hold">
-                      <p:stCondLst>
-                        <p:cond delay="indefinite"/>
-                      </p:stCondLst>
-                      <p:childTnLst>
-                        <p:par>
-                          <p:cTn id="4" fill="hold">
-                            <p:stCondLst>
-                              <p:cond delay="0"/>
-                            </p:stCondLst>
-                            <p:childTnLst>
-                              <p:par>
-                                <p:cTn id="5" presetID="9" presetClass="entr" presetSubtype="0" fill="hold" grpId="0" nodeType="clickEffect">
-                                  <p:stCondLst>
-                                    <p:cond delay="0"/>
-                                  </p:stCondLst>
-                                  <p:childTnLst>
-                                    <p:set>
-                                      <p:cBhvr>
-                                        <p:cTn id="6" dur="1" fill="hold">
-                                          <p:stCondLst>
-                                            <p:cond delay="0"/>
-                                          </p:stCondLst>
-                                        </p:cTn>
-                                        <p:tgtEl>
-                                          <p:spTgt spid="2"/>
-                                        </p:tgtEl>
-                                        <p:attrNameLst>
-                                          <p:attrName>style.visibility</p:attrName>
-                                        </p:attrNameLst>
-                                      </p:cBhvr>
-                                      <p:to>
-                                        <p:strVal val="visible"/>
-                                      </p:to>
-                                    </p:set>
-                                    <p:animEffect transition="in" filter="dissolve">
-                                      <p:cBhvr>
-                                        <p:cTn id="7" dur="500"/>
-                                        <p:tgtEl>
-                                          <p:spTgt spid="2"/>
-                                        </p:tgtEl>
-                                      </p:cBhvr>
-                                    </p:animEffect>
-                                  </p:childTnLst>
-                                </p:cTn>
-                              </p:par>
-                            </p:childTnLst>
-                          </p:cTn>
-                        </p:par>
-                      </p:childTnLst>
-                    </p:cTn>
-                  </p:par>
-                  <p:par>
-                    <p:cTn id="8" fill="hold">
-                      <p:stCondLst>
-                        <p:cond delay="indefinite"/>
-                      </p:stCondLst>
-                      <p:childTnLst>
-                        <p:par>
-                          <p:cTn id="9" fill="hold">
-                            <p:stCondLst>
-                              <p:cond delay="0"/>
-                            </p:stCondLst>
-                            <p:childTnLst>
-                              <p:par>
-                                <p:cTn id="10" presetID="9" presetClass="entr" presetSubtype="0" fill="hold" grpId="0" nodeType="clickEffect">
-                                  <p:stCondLst>
-                                    <p:cond delay="0"/>
-                                  </p:stCondLst>
-                                  <p:childTnLst>
-                                    <p:set>
-                                      <p:cBhvr>
-                                        <p:cTn id="11" dur="1" fill="hold">
-                                          <p:stCondLst>
-                                            <p:cond delay="0"/>
-                                          </p:stCondLst>
-                                        </p:cTn>
-                                        <p:tgtEl>
-                                          <p:spTgt spid="24"/>
-                                        </p:tgtEl>
-                                        <p:attrNameLst>
-                                          <p:attrName>style.visibility</p:attrName>
-                                        </p:attrNameLst>
-                                      </p:cBhvr>
-                                      <p:to>
-                                        <p:strVal val="visible"/>
-                                      </p:to>
-                                    </p:set>
-                                    <p:animEffect transition="in" filter="dissolve">
-                                      <p:cBhvr>
-                                        <p:cTn id="12" dur="500"/>
-                                        <p:tgtEl>
-                                          <p:spTgt spid="24"/>
-                                        </p:tgtEl>
-                                      </p:cBhvr>
-                                    </p:animEffect>
-                                  </p:childTnLst>
-                                </p:cTn>
-                              </p:par>
-                            </p:childTnLst>
-                          </p:cTn>
-                        </p:par>
-                      </p:childTnLst>
-                    </p:cTn>
-                  </p:par>
-                </p:childTnLst>
-              </p:cTn>
-              <p:prevCondLst>
-                <p:cond evt="onPrev" delay="0">
-                  <p:tgtEl>
-                    <p:sldTgt/>
-                  </p:tgtEl>
-                </p:cond>
-              </p:prevCondLst>
-              <p:nextCondLst>
-                <p:cond evt="onNext" delay="0">
-                  <p:tgtEl>
-                    <p:sldTgt/>
-                  </p:tgtEl>
-                </p:cond>
-              </p:nextCondLst>
-            </p:seq>
-          </p:childTnLst>
-        </p:cTn>
-      </p:par>
-    </p:tnLst>
-    <p:bldLst>
-      <p:bldP spid="2" grpId="0"/>
-      <p:bldP spid="24" grpId="0"/>
-    </p:bldLst>
-  </p:timing>
-</p:sld>
-</file>
-
-<file path=ppt/slides/slide9.xml><?xml version="1.0" encoding="utf-8"?>
-<p:sld xmlns:a="http://schemas.openxmlformats.org/drawingml/2006/main" xmlns:r="http://schemas.openxmlformats.org/officeDocument/2006/relationships" xmlns:p="http://schemas.openxmlformats.org/presentationml/2006/main">
-  <p:cSld>
-    <p:spTree>
-      <p:nvGrpSpPr>
-        <p:cNvPr id="1" name=""/>
-        <p:cNvGrpSpPr/>
-        <p:nvPr/>
-      </p:nvGrpSpPr>
-      <p:grpSpPr>
-        <a:xfrm>
-          <a:off x="0" y="0"/>
-          <a:ext cx="0" cy="0"/>
-          <a:chOff x="0" y="0"/>
-          <a:chExt cx="0" cy="0"/>
-        </a:xfrm>
-      </p:grpSpPr>
-      <p:grpSp>
-        <p:nvGrpSpPr>
-          <p:cNvPr id="3" name="Group 2">
-            <a:extLst>
-              <a:ext uri="{FF2B5EF4-FFF2-40B4-BE49-F238E27FC236}">
-                <a16:creationId xmlns:a16="http://schemas.microsoft.com/office/drawing/2014/main" id="{329804F1-EC99-6640-9898-8D1180320E91}"/>
-              </a:ext>
-            </a:extLst>
-          </p:cNvPr>
-          <p:cNvGrpSpPr/>
-          <p:nvPr/>
-        </p:nvGrpSpPr>
-        <p:grpSpPr>
-          <a:xfrm>
-            <a:off x="6832452" y="1416317"/>
-            <a:ext cx="2020009" cy="1733107"/>
-            <a:chOff x="5119398" y="548219"/>
-            <a:chExt cx="2020009" cy="1733107"/>
-          </a:xfrm>
-        </p:grpSpPr>
-        <p:sp>
-          <p:nvSpPr>
-            <p:cNvPr id="10" name="Rectangle 9">
-              <a:extLst>
-                <a:ext uri="{FF2B5EF4-FFF2-40B4-BE49-F238E27FC236}">
-                  <a16:creationId xmlns:a16="http://schemas.microsoft.com/office/drawing/2014/main" id="{88B1E9FC-E61C-A74B-A20A-0A5E6A186F9E}"/>
-                </a:ext>
-              </a:extLst>
-            </p:cNvPr>
-            <p:cNvSpPr/>
-            <p:nvPr/>
-          </p:nvSpPr>
-          <p:spPr>
-            <a:xfrm>
-              <a:off x="5289753" y="715273"/>
-              <a:ext cx="366181" cy="366181"/>
-            </a:xfrm>
-            <a:prstGeom prst="rect">
-              <a:avLst/>
-            </a:prstGeom>
-            <a:solidFill>
-              <a:srgbClr val="FF0000"/>
-            </a:solidFill>
-          </p:spPr>
-          <p:style>
-            <a:lnRef idx="2">
-              <a:schemeClr val="accent1">
-                <a:shade val="50000"/>
-              </a:schemeClr>
-            </a:lnRef>
-            <a:fillRef idx="1">
-              <a:schemeClr val="accent1"/>
-            </a:fillRef>
-            <a:effectRef idx="0">
-              <a:schemeClr val="accent1"/>
-            </a:effectRef>
-            <a:fontRef idx="minor">
-              <a:schemeClr val="lt1"/>
-            </a:fontRef>
-          </p:style>
-          <p:txBody>
-            <a:bodyPr rtlCol="0" anchor="ctr"/>
-            <a:lstStyle/>
-            <a:p>
-              <a:pPr algn="ctr"/>
-              <a:endParaRPr lang="en-US"/>
-            </a:p>
-          </p:txBody>
-        </p:sp>
-        <p:sp>
-          <p:nvSpPr>
-            <p:cNvPr id="11" name="Oval 10">
-              <a:extLst>
-                <a:ext uri="{FF2B5EF4-FFF2-40B4-BE49-F238E27FC236}">
-                  <a16:creationId xmlns:a16="http://schemas.microsoft.com/office/drawing/2014/main" id="{A570C3FF-1D00-9841-9058-AA75D28DC163}"/>
-                </a:ext>
-              </a:extLst>
-            </p:cNvPr>
-            <p:cNvSpPr/>
-            <p:nvPr/>
-          </p:nvSpPr>
-          <p:spPr>
-            <a:xfrm>
-              <a:off x="5119398" y="1568944"/>
-              <a:ext cx="712382" cy="712382"/>
-            </a:xfrm>
-            <a:prstGeom prst="ellipse">
-              <a:avLst/>
-            </a:prstGeom>
-            <a:solidFill>
-              <a:srgbClr val="FF0000"/>
-            </a:solidFill>
-          </p:spPr>
-          <p:style>
-            <a:lnRef idx="2">
-              <a:schemeClr val="accent1">
-                <a:shade val="50000"/>
-              </a:schemeClr>
-            </a:lnRef>
-            <a:fillRef idx="1">
-              <a:schemeClr val="accent1"/>
-            </a:fillRef>
-            <a:effectRef idx="0">
-              <a:schemeClr val="accent1"/>
-            </a:effectRef>
-            <a:fontRef idx="minor">
-              <a:schemeClr val="lt1"/>
-            </a:fontRef>
-          </p:style>
-          <p:txBody>
-            <a:bodyPr rtlCol="0" anchor="ctr"/>
-            <a:lstStyle/>
-            <a:p>
-              <a:pPr algn="ctr"/>
-              <a:endParaRPr lang="en-US">
-                <a:solidFill>
-                  <a:srgbClr val="00B050"/>
-                </a:solidFill>
-              </a:endParaRPr>
-            </a:p>
-          </p:txBody>
-        </p:sp>
-        <p:sp>
-          <p:nvSpPr>
-            <p:cNvPr id="22" name="Rectangle 21">
-              <a:extLst>
-                <a:ext uri="{FF2B5EF4-FFF2-40B4-BE49-F238E27FC236}">
-                  <a16:creationId xmlns:a16="http://schemas.microsoft.com/office/drawing/2014/main" id="{A93A280D-6F59-7946-AD82-034A1841B283}"/>
-                </a:ext>
-              </a:extLst>
-            </p:cNvPr>
-            <p:cNvSpPr/>
-            <p:nvPr/>
-          </p:nvSpPr>
-          <p:spPr>
-            <a:xfrm>
-              <a:off x="6427026" y="1568945"/>
-              <a:ext cx="712381" cy="712381"/>
-            </a:xfrm>
-            <a:prstGeom prst="rect">
-              <a:avLst/>
-            </a:prstGeom>
-            <a:solidFill>
-              <a:srgbClr val="FF0000"/>
-            </a:solidFill>
-          </p:spPr>
-          <p:style>
-            <a:lnRef idx="2">
-              <a:schemeClr val="accent1">
-                <a:shade val="50000"/>
-              </a:schemeClr>
-            </a:lnRef>
-            <a:fillRef idx="1">
-              <a:schemeClr val="accent1"/>
-            </a:fillRef>
-            <a:effectRef idx="0">
-              <a:schemeClr val="accent1"/>
-            </a:effectRef>
-            <a:fontRef idx="minor">
-              <a:schemeClr val="lt1"/>
-            </a:fontRef>
-          </p:style>
-          <p:txBody>
-            <a:bodyPr rtlCol="0" anchor="ctr"/>
-            <a:lstStyle/>
-            <a:p>
-              <a:pPr algn="ctr"/>
-              <a:endParaRPr lang="en-US"/>
-            </a:p>
-          </p:txBody>
-        </p:sp>
-        <p:sp>
-          <p:nvSpPr>
-            <p:cNvPr id="23" name="Rectangle 22">
-              <a:extLst>
-                <a:ext uri="{FF2B5EF4-FFF2-40B4-BE49-F238E27FC236}">
-                  <a16:creationId xmlns:a16="http://schemas.microsoft.com/office/drawing/2014/main" id="{1E039D96-646B-F842-A490-44A4095A7F55}"/>
-                </a:ext>
-              </a:extLst>
-            </p:cNvPr>
-            <p:cNvSpPr/>
-            <p:nvPr/>
-          </p:nvSpPr>
-          <p:spPr>
-            <a:xfrm>
-              <a:off x="6427026" y="548219"/>
-              <a:ext cx="712381" cy="712381"/>
-            </a:xfrm>
-            <a:prstGeom prst="rect">
-              <a:avLst/>
-            </a:prstGeom>
-            <a:solidFill>
-              <a:schemeClr val="accent6"/>
-            </a:solidFill>
-          </p:spPr>
-          <p:style>
-            <a:lnRef idx="2">
-              <a:schemeClr val="accent1">
-                <a:shade val="50000"/>
-              </a:schemeClr>
-            </a:lnRef>
-            <a:fillRef idx="1">
-              <a:schemeClr val="accent1"/>
-            </a:fillRef>
-            <a:effectRef idx="0">
-              <a:schemeClr val="accent1"/>
-            </a:effectRef>
-            <a:fontRef idx="minor">
-              <a:schemeClr val="lt1"/>
-            </a:fontRef>
-          </p:style>
-          <p:txBody>
-            <a:bodyPr rtlCol="0" anchor="ctr"/>
-            <a:lstStyle/>
-            <a:p>
-              <a:pPr algn="ctr"/>
-              <a:endParaRPr lang="en-US"/>
-            </a:p>
-          </p:txBody>
-        </p:sp>
-      </p:grpSp>
-      <p:sp>
-        <p:nvSpPr>
-          <p:cNvPr id="2" name="TextBox 1">
-            <a:extLst>
-              <a:ext uri="{FF2B5EF4-FFF2-40B4-BE49-F238E27FC236}">
-                <a16:creationId xmlns:a16="http://schemas.microsoft.com/office/drawing/2014/main" id="{3B297FFD-21FA-EB4F-93E9-3342B135EDF9}"/>
-              </a:ext>
-            </a:extLst>
-          </p:cNvPr>
-          <p:cNvSpPr txBox="1"/>
-          <p:nvPr/>
-        </p:nvSpPr>
-        <p:spPr>
-          <a:xfrm>
-            <a:off x="756139" y="1849943"/>
-            <a:ext cx="2200924" cy="4247317"/>
-          </a:xfrm>
-          <a:prstGeom prst="rect">
-            <a:avLst/>
-          </a:prstGeom>
-          <a:noFill/>
-        </p:spPr>
-        <p:txBody>
-          <a:bodyPr wrap="none" rtlCol="0">
-            <a:spAutoFit/>
-          </a:bodyPr>
-          <a:lstStyle/>
-          <a:p>
-            <a:r>
-              <a:rPr lang="en-US" dirty="0"/>
-              <a:t>property(fig1, red).</a:t>
-            </a:r>
-          </a:p>
-          <a:p>
-            <a:r>
-              <a:rPr lang="en-US" dirty="0"/>
-              <a:t>property(fig1, box).</a:t>
-            </a:r>
-          </a:p>
-          <a:p>
-            <a:r>
-              <a:rPr lang="en-US" dirty="0"/>
-              <a:t>property(fig1, small).</a:t>
-            </a:r>
-          </a:p>
-          <a:p>
-            <a:endParaRPr lang="en-US" dirty="0"/>
-          </a:p>
-          <a:p>
-            <a:r>
-              <a:rPr lang="en-US" dirty="0"/>
-              <a:t>property(fig2, green).</a:t>
-            </a:r>
-          </a:p>
-          <a:p>
-            <a:r>
-              <a:rPr lang="en-US" dirty="0"/>
-              <a:t>property(fig2, box).</a:t>
-            </a:r>
-          </a:p>
-          <a:p>
-            <a:r>
-              <a:rPr lang="en-US" dirty="0"/>
-              <a:t>property(fig2, large).</a:t>
-            </a:r>
-          </a:p>
-          <a:p>
-            <a:endParaRPr lang="en-US" dirty="0"/>
-          </a:p>
-          <a:p>
-            <a:r>
-              <a:rPr lang="en-US" dirty="0"/>
-              <a:t>property(fig3, red).</a:t>
-            </a:r>
-          </a:p>
-          <a:p>
-            <a:r>
-              <a:rPr lang="en-US" dirty="0"/>
-              <a:t>property(fig3, circle).</a:t>
-            </a:r>
-          </a:p>
-          <a:p>
-            <a:r>
-              <a:rPr lang="en-US" dirty="0"/>
-              <a:t>property(fig3, large).</a:t>
-            </a:r>
-          </a:p>
-          <a:p>
-            <a:endParaRPr lang="en-US" dirty="0"/>
-          </a:p>
-          <a:p>
-            <a:r>
-              <a:rPr lang="en-US" dirty="0"/>
-              <a:t>property(fig4, red).</a:t>
-            </a:r>
-          </a:p>
-          <a:p>
-            <a:r>
-              <a:rPr lang="en-US" dirty="0"/>
-              <a:t>property(fig4, box).</a:t>
-            </a:r>
-          </a:p>
-          <a:p>
-            <a:r>
-              <a:rPr lang="en-US" dirty="0"/>
-              <a:t>property(fig4, large).</a:t>
-            </a:r>
-          </a:p>
-        </p:txBody>
-      </p:sp>
-      <p:sp>
-        <p:nvSpPr>
-          <p:cNvPr id="24" name="TextBox 23">
-            <a:extLst>
-              <a:ext uri="{FF2B5EF4-FFF2-40B4-BE49-F238E27FC236}">
-                <a16:creationId xmlns:a16="http://schemas.microsoft.com/office/drawing/2014/main" id="{90BB4E62-C7CE-444C-B9F7-1DD2BE18B97A}"/>
-              </a:ext>
-            </a:extLst>
-          </p:cNvPr>
-          <p:cNvSpPr txBox="1"/>
-          <p:nvPr/>
-        </p:nvSpPr>
-        <p:spPr>
-          <a:xfrm>
-            <a:off x="4189979" y="3179890"/>
-            <a:ext cx="5991835" cy="3600986"/>
-          </a:xfrm>
-          <a:prstGeom prst="rect">
-            <a:avLst/>
-          </a:prstGeom>
-          <a:noFill/>
-        </p:spPr>
-        <p:txBody>
-          <a:bodyPr wrap="square" rtlCol="0">
-            <a:spAutoFit/>
-          </a:bodyPr>
-          <a:lstStyle/>
-          <a:p>
-            <a:r>
-              <a:rPr lang="en-US" sz="1200" dirty="0">
-                <a:solidFill>
-                  <a:srgbClr val="C00000"/>
-                </a:solidFill>
-                <a:latin typeface="Consolas" panose="020B0609020204030204" pitchFamily="49" charset="0"/>
-                <a:cs typeface="Consolas" panose="020B0609020204030204" pitchFamily="49" charset="0"/>
-              </a:rPr>
-              <a:t>% Fig. X is unique </a:t>
-            </a:r>
-            <a:r>
-              <a:rPr lang="en-US" sz="1200" dirty="0" err="1">
-                <a:solidFill>
-                  <a:srgbClr val="C00000"/>
-                </a:solidFill>
-                <a:latin typeface="Consolas" panose="020B0609020204030204" pitchFamily="49" charset="0"/>
-                <a:cs typeface="Consolas" panose="020B0609020204030204" pitchFamily="49" charset="0"/>
-              </a:rPr>
-              <a:t>wrt</a:t>
-            </a:r>
-            <a:r>
-              <a:rPr lang="en-US" sz="1200" dirty="0">
-                <a:solidFill>
-                  <a:srgbClr val="C00000"/>
-                </a:solidFill>
-                <a:latin typeface="Consolas" panose="020B0609020204030204" pitchFamily="49" charset="0"/>
-                <a:cs typeface="Consolas" panose="020B0609020204030204" pitchFamily="49" charset="0"/>
-              </a:rPr>
-              <a:t> property P and value V, if there is no ..</a:t>
-            </a:r>
-          </a:p>
-          <a:p>
-            <a:r>
-              <a:rPr lang="en-US" sz="1200" b="1" dirty="0">
-                <a:solidFill>
-                  <a:srgbClr val="0432FF"/>
-                </a:solidFill>
-                <a:latin typeface="Consolas" panose="020B0609020204030204" pitchFamily="49" charset="0"/>
-                <a:cs typeface="Consolas" panose="020B0609020204030204" pitchFamily="49" charset="0"/>
-              </a:rPr>
-              <a:t>unique</a:t>
-            </a:r>
-            <a:r>
-              <a:rPr lang="en-US" sz="1200" dirty="0">
-                <a:latin typeface="Consolas" panose="020B0609020204030204" pitchFamily="49" charset="0"/>
-                <a:cs typeface="Consolas" panose="020B0609020204030204" pitchFamily="49" charset="0"/>
-              </a:rPr>
-              <a:t>(F,V) :- property(F,V), </a:t>
-            </a:r>
-            <a:r>
-              <a:rPr lang="en-US" sz="1200" b="1" dirty="0">
-                <a:latin typeface="Consolas" panose="020B0609020204030204" pitchFamily="49" charset="0"/>
-                <a:cs typeface="Consolas" panose="020B0609020204030204" pitchFamily="49" charset="0"/>
-              </a:rPr>
-              <a:t>not</a:t>
-            </a:r>
-            <a:r>
-              <a:rPr lang="en-US" sz="1200" dirty="0">
-                <a:latin typeface="Consolas" panose="020B0609020204030204" pitchFamily="49" charset="0"/>
-                <a:cs typeface="Consolas" panose="020B0609020204030204" pitchFamily="49" charset="0"/>
-              </a:rPr>
-              <a:t> </a:t>
-            </a:r>
-            <a:r>
-              <a:rPr lang="en-US" sz="1200" dirty="0" err="1">
-                <a:latin typeface="Consolas" panose="020B0609020204030204" pitchFamily="49" charset="0"/>
-                <a:cs typeface="Consolas" panose="020B0609020204030204" pitchFamily="49" charset="0"/>
-              </a:rPr>
-              <a:t>exists_diff</a:t>
-            </a:r>
-            <a:r>
-              <a:rPr lang="en-US" sz="1200" dirty="0">
-                <a:latin typeface="Consolas" panose="020B0609020204030204" pitchFamily="49" charset="0"/>
-                <a:cs typeface="Consolas" panose="020B0609020204030204" pitchFamily="49" charset="0"/>
-              </a:rPr>
-              <a:t>(F,V).</a:t>
-            </a:r>
-          </a:p>
-          <a:p>
-            <a:endParaRPr lang="en-US" sz="1200" dirty="0">
-              <a:latin typeface="Consolas" panose="020B0609020204030204" pitchFamily="49" charset="0"/>
-              <a:cs typeface="Consolas" panose="020B0609020204030204" pitchFamily="49" charset="0"/>
-            </a:endParaRPr>
-          </a:p>
-          <a:p>
-            <a:r>
-              <a:rPr lang="en-US" sz="1200" dirty="0">
-                <a:solidFill>
-                  <a:srgbClr val="C00000"/>
-                </a:solidFill>
-                <a:latin typeface="Consolas" panose="020B0609020204030204" pitchFamily="49" charset="0"/>
-                <a:cs typeface="Consolas" panose="020B0609020204030204" pitchFamily="49" charset="0"/>
-              </a:rPr>
-              <a:t>% .. other figure Y that has the same property/value pair: </a:t>
-            </a:r>
-          </a:p>
-          <a:p>
-            <a:r>
-              <a:rPr lang="en-US" sz="1200" b="1" dirty="0" err="1">
-                <a:solidFill>
-                  <a:srgbClr val="0432FF"/>
-                </a:solidFill>
-                <a:latin typeface="Consolas" panose="020B0609020204030204" pitchFamily="49" charset="0"/>
-                <a:cs typeface="Consolas" panose="020B0609020204030204" pitchFamily="49" charset="0"/>
-              </a:rPr>
-              <a:t>exists_diff</a:t>
-            </a:r>
-            <a:r>
-              <a:rPr lang="en-US" sz="1200" dirty="0">
-                <a:latin typeface="Consolas" panose="020B0609020204030204" pitchFamily="49" charset="0"/>
-                <a:cs typeface="Consolas" panose="020B0609020204030204" pitchFamily="49" charset="0"/>
-              </a:rPr>
-              <a:t>(F,V) :- property(F,V), property(F2,V), F != F2. </a:t>
-            </a:r>
-          </a:p>
-          <a:p>
-            <a:endParaRPr lang="en-US" sz="1200" dirty="0">
-              <a:latin typeface="Consolas" panose="020B0609020204030204" pitchFamily="49" charset="0"/>
-              <a:cs typeface="Consolas" panose="020B0609020204030204" pitchFamily="49" charset="0"/>
-            </a:endParaRPr>
-          </a:p>
-          <a:p>
-            <a:r>
-              <a:rPr lang="en-US" sz="1200" dirty="0">
-                <a:solidFill>
-                  <a:srgbClr val="FF0000"/>
-                </a:solidFill>
-                <a:latin typeface="Consolas" panose="020B0609020204030204" pitchFamily="49" charset="0"/>
-                <a:cs typeface="Consolas" panose="020B0609020204030204" pitchFamily="49" charset="0"/>
-              </a:rPr>
-              <a:t>% Which figure F is special (</a:t>
-            </a:r>
-            <a:r>
-              <a:rPr lang="en-US" sz="1200" dirty="0" err="1">
-                <a:solidFill>
-                  <a:srgbClr val="FF0000"/>
-                </a:solidFill>
-                <a:latin typeface="Consolas" panose="020B0609020204030204" pitchFamily="49" charset="0"/>
-                <a:cs typeface="Consolas" panose="020B0609020204030204" pitchFamily="49" charset="0"/>
-              </a:rPr>
-              <a:t>wrt</a:t>
-            </a:r>
-            <a:r>
-              <a:rPr lang="en-US" sz="1200" dirty="0">
-                <a:solidFill>
-                  <a:srgbClr val="FF0000"/>
-                </a:solidFill>
-                <a:latin typeface="Consolas" panose="020B0609020204030204" pitchFamily="49" charset="0"/>
-                <a:cs typeface="Consolas" panose="020B0609020204030204" pitchFamily="49" charset="0"/>
-              </a:rPr>
-              <a:t> some property / value)</a:t>
-            </a:r>
-          </a:p>
-          <a:p>
-            <a:r>
-              <a:rPr lang="en-US" sz="1200" b="1" dirty="0">
-                <a:solidFill>
-                  <a:srgbClr val="0432FF"/>
-                </a:solidFill>
-                <a:latin typeface="Consolas" panose="020B0609020204030204" pitchFamily="49" charset="0"/>
-                <a:cs typeface="Consolas" panose="020B0609020204030204" pitchFamily="49" charset="0"/>
-              </a:rPr>
-              <a:t>special</a:t>
-            </a:r>
-            <a:r>
-              <a:rPr lang="en-US" sz="1200" dirty="0">
-                <a:latin typeface="Consolas" panose="020B0609020204030204" pitchFamily="49" charset="0"/>
-                <a:cs typeface="Consolas" panose="020B0609020204030204" pitchFamily="49" charset="0"/>
-              </a:rPr>
-              <a:t>(F) :- unique(F,_).</a:t>
-            </a:r>
-          </a:p>
-          <a:p>
-            <a:r>
-              <a:rPr lang="en-US" sz="1200" b="1" dirty="0">
-                <a:solidFill>
-                  <a:srgbClr val="0432FF"/>
-                </a:solidFill>
-                <a:latin typeface="Consolas" panose="020B0609020204030204" pitchFamily="49" charset="0"/>
-                <a:cs typeface="Consolas" panose="020B0609020204030204" pitchFamily="49" charset="0"/>
-              </a:rPr>
-              <a:t>normal</a:t>
-            </a:r>
-            <a:r>
-              <a:rPr lang="en-US" sz="1200" dirty="0">
-                <a:latin typeface="Consolas" panose="020B0609020204030204" pitchFamily="49" charset="0"/>
-                <a:cs typeface="Consolas" panose="020B0609020204030204" pitchFamily="49" charset="0"/>
-              </a:rPr>
-              <a:t>(F) :- property(F,_), not special(F).</a:t>
-            </a:r>
-          </a:p>
-          <a:p>
-            <a:endParaRPr lang="en-US" sz="1200" dirty="0">
-              <a:latin typeface="Consolas" panose="020B0609020204030204" pitchFamily="49" charset="0"/>
-              <a:cs typeface="Consolas" panose="020B0609020204030204" pitchFamily="49" charset="0"/>
-            </a:endParaRPr>
-          </a:p>
-          <a:p>
-            <a:r>
-              <a:rPr lang="en-US" sz="1200" dirty="0">
-                <a:solidFill>
-                  <a:schemeClr val="bg1">
-                    <a:lumMod val="50000"/>
-                  </a:schemeClr>
-                </a:solidFill>
-                <a:latin typeface="Courier" pitchFamily="2" charset="0"/>
-                <a:cs typeface="Consolas" panose="020B0609020204030204" pitchFamily="49" charset="0"/>
-              </a:rPr>
-              <a:t>% </a:t>
-            </a:r>
-            <a:r>
-              <a:rPr lang="en-US" sz="1200" dirty="0" err="1">
-                <a:solidFill>
-                  <a:schemeClr val="bg1">
-                    <a:lumMod val="50000"/>
-                  </a:schemeClr>
-                </a:solidFill>
-                <a:latin typeface="Courier" pitchFamily="2" charset="0"/>
-                <a:cs typeface="Consolas" panose="020B0609020204030204" pitchFamily="49" charset="0"/>
-              </a:rPr>
-              <a:t>clingo</a:t>
-            </a:r>
-            <a:r>
-              <a:rPr lang="en-US" sz="1200" dirty="0">
-                <a:solidFill>
-                  <a:schemeClr val="bg1">
-                    <a:lumMod val="50000"/>
-                  </a:schemeClr>
-                </a:solidFill>
-                <a:latin typeface="Courier" pitchFamily="2" charset="0"/>
-                <a:cs typeface="Consolas" panose="020B0609020204030204" pitchFamily="49" charset="0"/>
-              </a:rPr>
-              <a:t> -n0 example4.lp4 unique.lp4 </a:t>
-            </a:r>
-          </a:p>
-          <a:p>
-            <a:r>
-              <a:rPr lang="en-US" sz="1200" b="1" dirty="0">
-                <a:solidFill>
-                  <a:schemeClr val="bg1">
-                    <a:lumMod val="50000"/>
-                  </a:schemeClr>
-                </a:solidFill>
-                <a:latin typeface="Courier" pitchFamily="2" charset="0"/>
-                <a:cs typeface="Consolas" panose="020B0609020204030204" pitchFamily="49" charset="0"/>
-              </a:rPr>
-              <a:t>unique(fig1,small) </a:t>
-            </a:r>
-          </a:p>
-          <a:p>
-            <a:r>
-              <a:rPr lang="en-US" sz="1200" b="1" dirty="0">
-                <a:solidFill>
-                  <a:schemeClr val="bg1">
-                    <a:lumMod val="50000"/>
-                  </a:schemeClr>
-                </a:solidFill>
-                <a:latin typeface="Courier" pitchFamily="2" charset="0"/>
-                <a:cs typeface="Consolas" panose="020B0609020204030204" pitchFamily="49" charset="0"/>
-              </a:rPr>
-              <a:t>unique(fig2,green) </a:t>
-            </a:r>
-          </a:p>
-          <a:p>
-            <a:r>
-              <a:rPr lang="en-US" sz="1200" b="1" dirty="0">
-                <a:solidFill>
-                  <a:schemeClr val="bg1">
-                    <a:lumMod val="50000"/>
-                  </a:schemeClr>
-                </a:solidFill>
-                <a:latin typeface="Courier" pitchFamily="2" charset="0"/>
-                <a:cs typeface="Consolas" panose="020B0609020204030204" pitchFamily="49" charset="0"/>
-              </a:rPr>
-              <a:t>unique(fig3,circle)</a:t>
-            </a:r>
-          </a:p>
-          <a:p>
-            <a:r>
-              <a:rPr lang="en-US" sz="1200" b="1" dirty="0">
-                <a:solidFill>
-                  <a:srgbClr val="0432FF"/>
-                </a:solidFill>
-                <a:latin typeface="Consolas" panose="020B0609020204030204" pitchFamily="49" charset="0"/>
-                <a:cs typeface="Consolas" panose="020B0609020204030204" pitchFamily="49" charset="0"/>
-              </a:rPr>
-              <a:t>special(fig1) </a:t>
-            </a:r>
-          </a:p>
-          <a:p>
-            <a:r>
-              <a:rPr lang="en-US" sz="1200" b="1" dirty="0">
-                <a:solidFill>
-                  <a:srgbClr val="0432FF"/>
-                </a:solidFill>
-                <a:latin typeface="Consolas" panose="020B0609020204030204" pitchFamily="49" charset="0"/>
-                <a:cs typeface="Consolas" panose="020B0609020204030204" pitchFamily="49" charset="0"/>
-              </a:rPr>
-              <a:t>special(fig2) </a:t>
-            </a:r>
-          </a:p>
-          <a:p>
-            <a:r>
-              <a:rPr lang="en-US" sz="1200" b="1" dirty="0">
-                <a:solidFill>
-                  <a:srgbClr val="0432FF"/>
-                </a:solidFill>
-                <a:latin typeface="Consolas" panose="020B0609020204030204" pitchFamily="49" charset="0"/>
-                <a:cs typeface="Consolas" panose="020B0609020204030204" pitchFamily="49" charset="0"/>
-              </a:rPr>
-              <a:t>special(fig3)</a:t>
-            </a:r>
-          </a:p>
-          <a:p>
-            <a:r>
-              <a:rPr lang="en-US" sz="1200" b="1" dirty="0">
-                <a:solidFill>
-                  <a:srgbClr val="FF0000"/>
-                </a:solidFill>
-                <a:latin typeface="Consolas" panose="020B0609020204030204" pitchFamily="49" charset="0"/>
-                <a:cs typeface="Consolas" panose="020B0609020204030204" pitchFamily="49" charset="0"/>
-              </a:rPr>
-              <a:t>normal(fig4) </a:t>
-            </a:r>
-          </a:p>
-          <a:p>
-            <a:endParaRPr lang="en-US" sz="1200" b="1" dirty="0">
-              <a:solidFill>
-                <a:schemeClr val="bg1">
-                  <a:lumMod val="50000"/>
-                </a:schemeClr>
-              </a:solidFill>
-              <a:latin typeface="Courier" pitchFamily="2" charset="0"/>
-              <a:cs typeface="Consolas" panose="020B0609020204030204" pitchFamily="49" charset="0"/>
-            </a:endParaRPr>
-          </a:p>
-        </p:txBody>
-      </p:sp>
-      <p:sp>
-        <p:nvSpPr>
-          <p:cNvPr id="4" name="Title 3">
-            <a:extLst>
-              <a:ext uri="{FF2B5EF4-FFF2-40B4-BE49-F238E27FC236}">
-                <a16:creationId xmlns:a16="http://schemas.microsoft.com/office/drawing/2014/main" id="{47815922-51F6-084B-B251-636949D6694B}"/>
-              </a:ext>
-            </a:extLst>
-          </p:cNvPr>
-          <p:cNvSpPr>
-            <a:spLocks noGrp="1"/>
-          </p:cNvSpPr>
-          <p:nvPr>
-            <p:ph type="title"/>
-          </p:nvPr>
-        </p:nvSpPr>
-        <p:spPr>
-          <a:xfrm>
-            <a:off x="838200" y="115380"/>
-            <a:ext cx="10515600" cy="1325563"/>
-          </a:xfrm>
-        </p:spPr>
-        <p:txBody>
-          <a:bodyPr>
-            <a:normAutofit fontScale="90000"/>
-          </a:bodyPr>
-          <a:lstStyle/>
-          <a:p>
-            <a:r>
-              <a:rPr lang="en-US" dirty="0"/>
-              <a:t>Example 4: </a:t>
-            </a:r>
-            <a:r>
-              <a:rPr lang="en-US" sz="3600" dirty="0"/>
-              <a:t>... if (almost) everyone is special, who really does stand out? The only “</a:t>
-            </a:r>
-            <a:r>
-              <a:rPr lang="en-US" sz="3600" dirty="0" err="1"/>
-              <a:t>unspecial</a:t>
-            </a:r>
-            <a:r>
-              <a:rPr lang="en-US" sz="3600" dirty="0"/>
-              <a:t>” or “most normal” figure!</a:t>
-            </a:r>
-            <a:endParaRPr lang="en-US" dirty="0"/>
-          </a:p>
-        </p:txBody>
-      </p:sp>
-    </p:spTree>
-    <p:extLst>
-      <p:ext uri="{BB962C8B-B14F-4D97-AF65-F5344CB8AC3E}">
-        <p14:creationId xmlns:p14="http://schemas.microsoft.com/office/powerpoint/2010/main" val="1782839240"/>
       </p:ext>
     </p:extLst>
   </p:cSld>

</xml_diff>